<commit_message>
correct feedback text position
</commit_message>
<xml_diff>
--- a/images/Images NEW.pptx
+++ b/images/Images NEW.pptx
@@ -23,6 +23,8 @@
     <p:sldId id="269" r:id="rId18"/>
     <p:sldId id="270" r:id="rId19"/>
     <p:sldId id="271" r:id="rId20"/>
+    <p:sldId id="272" r:id="rId21"/>
+    <p:sldId id="273" r:id="rId22"/>
   </p:sldIdLst>
   <p:sldSz cx="12192000" cy="6858000"/>
   <p:notesSz cx="7559675" cy="10691812"/>
@@ -4076,7 +4078,79 @@
               <a:rPr b="0" lang="en-GB" sz="4400" spc="-1" strike="noStrike">
                 <a:latin typeface="Arial"/>
               </a:rPr>
-              <a:t>Click to edit the title text format</a:t>
+              <a:t>Cli</a:t>
+            </a:r>
+            <a:r>
+              <a:rPr b="0" lang="en-GB" sz="4400" spc="-1" strike="noStrike">
+                <a:latin typeface="Arial"/>
+              </a:rPr>
+              <a:t>ck </a:t>
+            </a:r>
+            <a:r>
+              <a:rPr b="0" lang="en-GB" sz="4400" spc="-1" strike="noStrike">
+                <a:latin typeface="Arial"/>
+              </a:rPr>
+              <a:t>to </a:t>
+            </a:r>
+            <a:r>
+              <a:rPr b="0" lang="en-GB" sz="4400" spc="-1" strike="noStrike">
+                <a:latin typeface="Arial"/>
+              </a:rPr>
+              <a:t>edi</a:t>
+            </a:r>
+            <a:r>
+              <a:rPr b="0" lang="en-GB" sz="4400" spc="-1" strike="noStrike">
+                <a:latin typeface="Arial"/>
+              </a:rPr>
+              <a:t>t </a:t>
+            </a:r>
+            <a:r>
+              <a:rPr b="0" lang="en-GB" sz="4400" spc="-1" strike="noStrike">
+                <a:latin typeface="Arial"/>
+              </a:rPr>
+              <a:t>the </a:t>
+            </a:r>
+            <a:r>
+              <a:rPr b="0" lang="en-GB" sz="4400" spc="-1" strike="noStrike">
+                <a:latin typeface="Arial"/>
+              </a:rPr>
+              <a:t>titl</a:t>
+            </a:r>
+            <a:r>
+              <a:rPr b="0" lang="en-GB" sz="4400" spc="-1" strike="noStrike">
+                <a:latin typeface="Arial"/>
+              </a:rPr>
+              <a:t>e </a:t>
+            </a:r>
+            <a:r>
+              <a:rPr b="0" lang="en-GB" sz="4400" spc="-1" strike="noStrike">
+                <a:latin typeface="Arial"/>
+              </a:rPr>
+              <a:t>tex</a:t>
+            </a:r>
+            <a:r>
+              <a:rPr b="0" lang="en-GB" sz="4400" spc="-1" strike="noStrike">
+                <a:latin typeface="Arial"/>
+              </a:rPr>
+              <a:t>t </a:t>
+            </a:r>
+            <a:r>
+              <a:rPr b="0" lang="en-GB" sz="4400" spc="-1" strike="noStrike">
+                <a:latin typeface="Arial"/>
+              </a:rPr>
+              <a:t>for</a:t>
+            </a:r>
+            <a:r>
+              <a:rPr b="0" lang="en-GB" sz="4400" spc="-1" strike="noStrike">
+                <a:latin typeface="Arial"/>
+              </a:rPr>
+              <a:t>ma</a:t>
+            </a:r>
+            <a:r>
+              <a:rPr b="0" lang="en-GB" sz="4400" spc="-1" strike="noStrike">
+                <a:latin typeface="Arial"/>
+              </a:rPr>
+              <a:t>t</a:t>
             </a:r>
             <a:endParaRPr b="0" lang="en-GB" sz="4400" spc="-1" strike="noStrike">
               <a:latin typeface="Arial"/>
@@ -4825,7 +4899,7 @@
         <p:spPr>
           <a:xfrm>
             <a:off x="5453640" y="549000"/>
-            <a:ext cx="1260360" cy="546120"/>
+            <a:ext cx="1260000" cy="545760"/>
           </a:xfrm>
           <a:prstGeom prst="rect">
             <a:avLst/>
@@ -4874,7 +4948,7 @@
         <p:spPr>
           <a:xfrm>
             <a:off x="2556360" y="1527840"/>
-            <a:ext cx="7054920" cy="1002960"/>
+            <a:ext cx="7054560" cy="1002600"/>
           </a:xfrm>
           <a:prstGeom prst="rect">
             <a:avLst/>
@@ -4943,7 +5017,7 @@
         <p:spPr>
           <a:xfrm>
             <a:off x="6465960" y="3968280"/>
-            <a:ext cx="1158480" cy="394200"/>
+            <a:ext cx="1158120" cy="393840"/>
           </a:xfrm>
           <a:prstGeom prst="rect">
             <a:avLst/>
@@ -4992,7 +5066,7 @@
         <p:spPr>
           <a:xfrm>
             <a:off x="4282920" y="3968280"/>
-            <a:ext cx="1200960" cy="394200"/>
+            <a:ext cx="1200600" cy="393840"/>
           </a:xfrm>
           <a:prstGeom prst="rect">
             <a:avLst/>
@@ -5041,7 +5115,7 @@
         <p:spPr>
           <a:xfrm>
             <a:off x="4284000" y="4596480"/>
-            <a:ext cx="1153800" cy="546120"/>
+            <a:ext cx="1153440" cy="545760"/>
           </a:xfrm>
           <a:prstGeom prst="rect">
             <a:avLst/>
@@ -5090,7 +5164,7 @@
         <p:spPr>
           <a:xfrm>
             <a:off x="6590160" y="4596480"/>
-            <a:ext cx="1033560" cy="546120"/>
+            <a:ext cx="1033200" cy="545760"/>
           </a:xfrm>
           <a:prstGeom prst="rect">
             <a:avLst/>
@@ -5139,7 +5213,7 @@
         <p:spPr>
           <a:xfrm>
             <a:off x="3378960" y="2968200"/>
-            <a:ext cx="5406120" cy="546120"/>
+            <a:ext cx="5405760" cy="545760"/>
           </a:xfrm>
           <a:prstGeom prst="rect">
             <a:avLst/>
@@ -5199,7 +5273,7 @@
         <p:spPr>
           <a:xfrm>
             <a:off x="2830680" y="5670720"/>
-            <a:ext cx="6528960" cy="546120"/>
+            <a:ext cx="6528600" cy="545760"/>
           </a:xfrm>
           <a:prstGeom prst="rect">
             <a:avLst/>
@@ -5248,7 +5322,7 @@
         <p:spPr>
           <a:xfrm>
             <a:off x="5689800" y="4319280"/>
-            <a:ext cx="402480" cy="546120"/>
+            <a:ext cx="402120" cy="545760"/>
           </a:xfrm>
           <a:prstGeom prst="rect">
             <a:avLst/>
@@ -5345,8 +5419,8 @@
         </p:nvSpPr>
         <p:spPr>
           <a:xfrm>
-            <a:off x="544680" y="573120"/>
-            <a:ext cx="10738440" cy="698760"/>
+            <a:off x="3362400" y="917640"/>
+            <a:ext cx="4811040" cy="545760"/>
           </a:xfrm>
           <a:prstGeom prst="rect">
             <a:avLst/>
@@ -5371,16 +5445,16 @@
               </a:lnSpc>
             </a:pPr>
             <a:r>
-              <a:rPr b="0" lang="en-GB" sz="4000" spc="-1" strike="noStrike">
+              <a:rPr b="0" lang="en-GB" sz="3000" spc="-1" strike="noStrike">
                 <a:solidFill>
                   <a:srgbClr val="000000"/>
                 </a:solidFill>
                 <a:latin typeface="Arial"/>
                 <a:ea typeface="DejaVu Sans"/>
               </a:rPr>
-              <a:t>On va te présenter 15 paires de mots à la suite</a:t>
-            </a:r>
-            <a:endParaRPr b="0" lang="en-GB" sz="4000" spc="-1" strike="noStrike">
+              <a:t>Essaye de traduire ce mot !</a:t>
+            </a:r>
+            <a:endParaRPr b="0" lang="en-GB" sz="3000" spc="-1" strike="noStrike">
               <a:latin typeface="Arial"/>
             </a:endParaRPr>
           </a:p>
@@ -5394,8 +5468,8 @@
         </p:nvSpPr>
         <p:spPr>
           <a:xfrm>
-            <a:off x="1671840" y="5653800"/>
-            <a:ext cx="8328960" cy="622800"/>
+            <a:off x="3621960" y="2237400"/>
+            <a:ext cx="4050720" cy="545760"/>
           </a:xfrm>
           <a:prstGeom prst="rect">
             <a:avLst/>
@@ -5420,16 +5494,36 @@
               </a:lnSpc>
             </a:pPr>
             <a:r>
-              <a:rPr b="0" lang="en-GB" sz="3500" spc="-1" strike="noStrike">
+              <a:rPr b="0" lang="en-GB" sz="3000" spc="-1" strike="noStrike">
                 <a:solidFill>
                   <a:srgbClr val="000000"/>
                 </a:solidFill>
                 <a:latin typeface="Arial"/>
                 <a:ea typeface="DejaVu Sans"/>
               </a:rPr>
-              <a:t>Appuie sur une touche pour commencer !</a:t>
-            </a:r>
-            <a:endParaRPr b="0" lang="en-GB" sz="3500" spc="-1" strike="noStrike">
+              <a:t>Ecrit le mot en français</a:t>
+            </a:r>
+            <a:endParaRPr b="0" lang="en-GB" sz="3000" spc="-1" strike="noStrike">
+              <a:latin typeface="Arial"/>
+            </a:endParaRPr>
+          </a:p>
+          <a:p>
+            <a:pPr algn="ctr">
+              <a:lnSpc>
+                <a:spcPct val="100000"/>
+              </a:lnSpc>
+            </a:pPr>
+            <a:r>
+              <a:rPr b="0" lang="en-GB" sz="3000" spc="-1" strike="noStrike">
+                <a:solidFill>
+                  <a:srgbClr val="000000"/>
+                </a:solidFill>
+                <a:latin typeface="Arial"/>
+                <a:ea typeface="DejaVu Sans"/>
+              </a:rPr>
+              <a:t> </a:t>
+            </a:r>
+            <a:endParaRPr b="0" lang="en-GB" sz="3000" spc="-1" strike="noStrike">
               <a:latin typeface="Arial"/>
             </a:endParaRPr>
           </a:p>
@@ -5443,8 +5537,8 @@
         </p:nvSpPr>
         <p:spPr>
           <a:xfrm>
-            <a:off x="1020240" y="1758600"/>
-            <a:ext cx="9787320" cy="622800"/>
+            <a:off x="6482520" y="3557520"/>
+            <a:ext cx="391320" cy="545760"/>
           </a:xfrm>
           <a:prstGeom prst="rect">
             <a:avLst/>
@@ -5469,16 +5563,16 @@
               </a:lnSpc>
             </a:pPr>
             <a:r>
-              <a:rPr b="0" lang="en-GB" sz="3500" spc="-1" strike="noStrike">
+              <a:rPr b="0" lang="en-GB" sz="3000" spc="-1" strike="noStrike">
                 <a:solidFill>
                   <a:srgbClr val="000000"/>
                 </a:solidFill>
                 <a:latin typeface="Arial"/>
                 <a:ea typeface="DejaVu Sans"/>
               </a:rPr>
-              <a:t>Essaye de retenir la traduction de tous les mots !</a:t>
-            </a:r>
-            <a:endParaRPr b="0" lang="en-GB" sz="3500" spc="-1" strike="noStrike">
+              <a:t>?</a:t>
+            </a:r>
+            <a:endParaRPr b="0" lang="en-GB" sz="3000" spc="-1" strike="noStrike">
               <a:latin typeface="Arial"/>
             </a:endParaRPr>
           </a:p>
@@ -5492,8 +5586,8 @@
         </p:nvSpPr>
         <p:spPr>
           <a:xfrm>
-            <a:off x="1449720" y="3183120"/>
-            <a:ext cx="8773920" cy="1156320"/>
+            <a:off x="5241600" y="3557520"/>
+            <a:ext cx="402120" cy="545760"/>
           </a:xfrm>
           <a:prstGeom prst="rect">
             <a:avLst/>
@@ -5518,492 +5612,16 @@
               </a:lnSpc>
             </a:pPr>
             <a:r>
-              <a:rPr b="0" lang="en-GB" sz="3500" spc="-1" strike="noStrike">
+              <a:rPr b="0" lang="en-GB" sz="3000" spc="-1" strike="noStrike">
                 <a:solidFill>
                   <a:srgbClr val="000000"/>
                 </a:solidFill>
                 <a:latin typeface="Arial"/>
                 <a:ea typeface="DejaVu Sans"/>
               </a:rPr>
-              <a:t>Plus tard, on te donnera le mot Hongrois et </a:t>
-            </a:r>
-            <a:endParaRPr b="0" lang="en-GB" sz="3500" spc="-1" strike="noStrike">
-              <a:latin typeface="Arial"/>
-            </a:endParaRPr>
-          </a:p>
-          <a:p>
-            <a:pPr algn="ctr">
-              <a:lnSpc>
-                <a:spcPct val="100000"/>
-              </a:lnSpc>
-            </a:pPr>
-            <a:r>
-              <a:rPr b="0" lang="en-GB" sz="3500" spc="-1" strike="noStrike">
-                <a:solidFill>
-                  <a:srgbClr val="000000"/>
-                </a:solidFill>
-                <a:latin typeface="Arial"/>
-                <a:ea typeface="DejaVu Sans"/>
-              </a:rPr>
-              <a:t>tu devras écrire la traduction en français</a:t>
-            </a:r>
-            <a:endParaRPr b="0" lang="en-GB" sz="3500" spc="-1" strike="noStrike">
-              <a:latin typeface="Arial"/>
-            </a:endParaRPr>
-          </a:p>
-        </p:txBody>
-      </p:sp>
-    </p:spTree>
-  </p:cSld>
-</p:sld>
-</file>
-
-<file path=ppt/slides/slide11.xml><?xml version="1.0" encoding="utf-8"?>
-<p:sld xmlns:a="http://schemas.openxmlformats.org/drawingml/2006/main" xmlns:p="http://schemas.openxmlformats.org/presentationml/2006/main" xmlns:r="http://schemas.openxmlformats.org/officeDocument/2006/relationships" xmlns:p14="http://schemas.microsoft.com/office/powerpoint/2010/main" xmlns:p15="http://schemas.microsoft.com/office/powerpoint/2012/main" xmlns:mc="http://schemas.openxmlformats.org/markup-compatibility/2006">
-  <p:cSld>
-    <p:spTree>
-      <p:nvGrpSpPr>
-        <p:cNvPr id="1" name=""/>
-        <p:cNvGrpSpPr/>
-        <p:nvPr/>
-      </p:nvGrpSpPr>
-      <p:grpSpPr>
-        <a:xfrm>
-          <a:off x="0" y="0"/>
-          <a:ext cx="0" cy="0"/>
-          <a:chOff x="0" y="0"/>
-          <a:chExt cx="0" cy="0"/>
-        </a:xfrm>
-      </p:grpSpPr>
-      <p:sp>
-        <p:nvSpPr>
-          <p:cNvPr id="168" name="CustomShape 1"/>
-          <p:cNvSpPr/>
-          <p:nvPr/>
-        </p:nvSpPr>
-        <p:spPr>
-          <a:xfrm>
-            <a:off x="544680" y="573120"/>
-            <a:ext cx="10738440" cy="698760"/>
-          </a:xfrm>
-          <a:prstGeom prst="rect">
-            <a:avLst/>
-          </a:prstGeom>
-          <a:noFill/>
-          <a:ln>
-            <a:noFill/>
-          </a:ln>
-        </p:spPr>
-        <p:style>
-          <a:lnRef idx="0"/>
-          <a:fillRef idx="0"/>
-          <a:effectRef idx="0"/>
-          <a:fontRef idx="minor"/>
-        </p:style>
-        <p:txBody>
-          <a:bodyPr wrap="none" lIns="90000" rIns="90000" tIns="45000" bIns="45000"/>
-          <a:p>
-            <a:pPr algn="ctr">
-              <a:lnSpc>
-                <a:spcPct val="100000"/>
-              </a:lnSpc>
-            </a:pPr>
-            <a:r>
-              <a:rPr b="0" lang="en-GB" sz="4000" spc="-1" strike="noStrike">
-                <a:solidFill>
-                  <a:srgbClr val="000000"/>
-                </a:solidFill>
-                <a:latin typeface="Arial"/>
-                <a:ea typeface="DejaVu Sans"/>
-              </a:rPr>
-              <a:t>On va te présenter 40 paires de mots à la suite</a:t>
-            </a:r>
-            <a:endParaRPr b="0" lang="en-GB" sz="4000" spc="-1" strike="noStrike">
-              <a:latin typeface="Arial"/>
-            </a:endParaRPr>
-          </a:p>
-        </p:txBody>
-      </p:sp>
-      <p:sp>
-        <p:nvSpPr>
-          <p:cNvPr id="169" name="CustomShape 2"/>
-          <p:cNvSpPr/>
-          <p:nvPr/>
-        </p:nvSpPr>
-        <p:spPr>
-          <a:xfrm>
-            <a:off x="1671840" y="5653800"/>
-            <a:ext cx="8328960" cy="622800"/>
-          </a:xfrm>
-          <a:prstGeom prst="rect">
-            <a:avLst/>
-          </a:prstGeom>
-          <a:noFill/>
-          <a:ln>
-            <a:noFill/>
-          </a:ln>
-        </p:spPr>
-        <p:style>
-          <a:lnRef idx="0"/>
-          <a:fillRef idx="0"/>
-          <a:effectRef idx="0"/>
-          <a:fontRef idx="minor"/>
-        </p:style>
-        <p:txBody>
-          <a:bodyPr wrap="none" lIns="90000" rIns="90000" tIns="45000" bIns="45000"/>
-          <a:p>
-            <a:pPr algn="ctr">
-              <a:lnSpc>
-                <a:spcPct val="100000"/>
-              </a:lnSpc>
-            </a:pPr>
-            <a:r>
-              <a:rPr b="0" lang="en-GB" sz="3500" spc="-1" strike="noStrike">
-                <a:solidFill>
-                  <a:srgbClr val="000000"/>
-                </a:solidFill>
-                <a:latin typeface="Arial"/>
-                <a:ea typeface="DejaVu Sans"/>
-              </a:rPr>
-              <a:t>Appuie sur une touche pour commencer !</a:t>
-            </a:r>
-            <a:endParaRPr b="0" lang="en-GB" sz="3500" spc="-1" strike="noStrike">
-              <a:latin typeface="Arial"/>
-            </a:endParaRPr>
-          </a:p>
-        </p:txBody>
-      </p:sp>
-      <p:sp>
-        <p:nvSpPr>
-          <p:cNvPr id="170" name="CustomShape 3"/>
-          <p:cNvSpPr/>
-          <p:nvPr/>
-        </p:nvSpPr>
-        <p:spPr>
-          <a:xfrm>
-            <a:off x="1020240" y="1758600"/>
-            <a:ext cx="9787320" cy="622800"/>
-          </a:xfrm>
-          <a:prstGeom prst="rect">
-            <a:avLst/>
-          </a:prstGeom>
-          <a:noFill/>
-          <a:ln>
-            <a:noFill/>
-          </a:ln>
-        </p:spPr>
-        <p:style>
-          <a:lnRef idx="0"/>
-          <a:fillRef idx="0"/>
-          <a:effectRef idx="0"/>
-          <a:fontRef idx="minor"/>
-        </p:style>
-        <p:txBody>
-          <a:bodyPr wrap="none" lIns="90000" rIns="90000" tIns="45000" bIns="45000"/>
-          <a:p>
-            <a:pPr algn="ctr">
-              <a:lnSpc>
-                <a:spcPct val="100000"/>
-              </a:lnSpc>
-            </a:pPr>
-            <a:r>
-              <a:rPr b="0" lang="en-GB" sz="3500" spc="-1" strike="noStrike">
-                <a:solidFill>
-                  <a:srgbClr val="000000"/>
-                </a:solidFill>
-                <a:latin typeface="Arial"/>
-                <a:ea typeface="DejaVu Sans"/>
-              </a:rPr>
-              <a:t>Essaye de retenir la traduction de tous les mots !</a:t>
-            </a:r>
-            <a:endParaRPr b="0" lang="en-GB" sz="3500" spc="-1" strike="noStrike">
-              <a:latin typeface="Arial"/>
-            </a:endParaRPr>
-          </a:p>
-        </p:txBody>
-      </p:sp>
-      <p:sp>
-        <p:nvSpPr>
-          <p:cNvPr id="171" name="CustomShape 4"/>
-          <p:cNvSpPr/>
-          <p:nvPr/>
-        </p:nvSpPr>
-        <p:spPr>
-          <a:xfrm>
-            <a:off x="1449720" y="3183120"/>
-            <a:ext cx="8773920" cy="1156320"/>
-          </a:xfrm>
-          <a:prstGeom prst="rect">
-            <a:avLst/>
-          </a:prstGeom>
-          <a:noFill/>
-          <a:ln>
-            <a:noFill/>
-          </a:ln>
-        </p:spPr>
-        <p:style>
-          <a:lnRef idx="0"/>
-          <a:fillRef idx="0"/>
-          <a:effectRef idx="0"/>
-          <a:fontRef idx="minor"/>
-        </p:style>
-        <p:txBody>
-          <a:bodyPr wrap="none" lIns="90000" rIns="90000" tIns="45000" bIns="45000"/>
-          <a:p>
-            <a:pPr algn="ctr">
-              <a:lnSpc>
-                <a:spcPct val="100000"/>
-              </a:lnSpc>
-            </a:pPr>
-            <a:r>
-              <a:rPr b="0" lang="en-GB" sz="3500" spc="-1" strike="noStrike">
-                <a:solidFill>
-                  <a:srgbClr val="000000"/>
-                </a:solidFill>
-                <a:latin typeface="Arial"/>
-                <a:ea typeface="DejaVu Sans"/>
-              </a:rPr>
-              <a:t>Plus tard, on te donnera le mot Hongrois et </a:t>
-            </a:r>
-            <a:endParaRPr b="0" lang="en-GB" sz="3500" spc="-1" strike="noStrike">
-              <a:latin typeface="Arial"/>
-            </a:endParaRPr>
-          </a:p>
-          <a:p>
-            <a:pPr algn="ctr">
-              <a:lnSpc>
-                <a:spcPct val="100000"/>
-              </a:lnSpc>
-            </a:pPr>
-            <a:r>
-              <a:rPr b="0" lang="en-GB" sz="3500" spc="-1" strike="noStrike">
-                <a:solidFill>
-                  <a:srgbClr val="000000"/>
-                </a:solidFill>
-                <a:latin typeface="Arial"/>
-                <a:ea typeface="DejaVu Sans"/>
-              </a:rPr>
-              <a:t>tu devras écrire la traduction en français</a:t>
-            </a:r>
-            <a:endParaRPr b="0" lang="en-GB" sz="3500" spc="-1" strike="noStrike">
-              <a:latin typeface="Arial"/>
-            </a:endParaRPr>
-          </a:p>
-        </p:txBody>
-      </p:sp>
-    </p:spTree>
-  </p:cSld>
-</p:sld>
-</file>
-
-<file path=ppt/slides/slide12.xml><?xml version="1.0" encoding="utf-8"?>
-<p:sld xmlns:a="http://schemas.openxmlformats.org/drawingml/2006/main" xmlns:p="http://schemas.openxmlformats.org/presentationml/2006/main" xmlns:r="http://schemas.openxmlformats.org/officeDocument/2006/relationships" xmlns:p14="http://schemas.microsoft.com/office/powerpoint/2010/main" xmlns:p15="http://schemas.microsoft.com/office/powerpoint/2012/main" xmlns:mc="http://schemas.openxmlformats.org/markup-compatibility/2006">
-  <p:cSld>
-    <p:spTree>
-      <p:nvGrpSpPr>
-        <p:cNvPr id="1" name=""/>
-        <p:cNvGrpSpPr/>
-        <p:nvPr/>
-      </p:nvGrpSpPr>
-      <p:grpSpPr>
-        <a:xfrm>
-          <a:off x="0" y="0"/>
-          <a:ext cx="0" cy="0"/>
-          <a:chOff x="0" y="0"/>
-          <a:chExt cx="0" cy="0"/>
-        </a:xfrm>
-      </p:grpSpPr>
-      <p:sp>
-        <p:nvSpPr>
-          <p:cNvPr id="172" name="CustomShape 1"/>
-          <p:cNvSpPr/>
-          <p:nvPr/>
-        </p:nvSpPr>
-        <p:spPr>
-          <a:xfrm>
-            <a:off x="2952000" y="3176640"/>
-            <a:ext cx="1478520" cy="698760"/>
-          </a:xfrm>
-          <a:prstGeom prst="rect">
-            <a:avLst/>
-          </a:prstGeom>
-          <a:noFill/>
-          <a:ln>
-            <a:noFill/>
-          </a:ln>
-        </p:spPr>
-        <p:style>
-          <a:lnRef idx="0"/>
-          <a:fillRef idx="0"/>
-          <a:effectRef idx="0"/>
-          <a:fontRef idx="minor"/>
-        </p:style>
-        <p:txBody>
-          <a:bodyPr wrap="none" lIns="90000" rIns="90000" tIns="45000" bIns="45000"/>
-          <a:p>
-            <a:pPr algn="ctr">
-              <a:lnSpc>
-                <a:spcPct val="100000"/>
-              </a:lnSpc>
-            </a:pPr>
-            <a:r>
-              <a:rPr b="0" lang="en-GB" sz="4000" spc="-1" strike="noStrike">
-                <a:solidFill>
-                  <a:srgbClr val="000000"/>
-                </a:solidFill>
-                <a:latin typeface="Arial"/>
-                <a:ea typeface="DejaVu Sans"/>
-              </a:rPr>
-              <a:t>Vonat</a:t>
-            </a:r>
-            <a:endParaRPr b="0" lang="en-GB" sz="4000" spc="-1" strike="noStrike">
-              <a:latin typeface="Arial"/>
-            </a:endParaRPr>
-          </a:p>
-        </p:txBody>
-      </p:sp>
-      <p:sp>
-        <p:nvSpPr>
-          <p:cNvPr id="173" name="CustomShape 2"/>
-          <p:cNvSpPr/>
-          <p:nvPr/>
-        </p:nvSpPr>
-        <p:spPr>
-          <a:xfrm>
-            <a:off x="5347800" y="3253680"/>
-            <a:ext cx="440640" cy="622800"/>
-          </a:xfrm>
-          <a:prstGeom prst="rect">
-            <a:avLst/>
-          </a:prstGeom>
-          <a:noFill/>
-          <a:ln>
-            <a:noFill/>
-          </a:ln>
-        </p:spPr>
-        <p:style>
-          <a:lnRef idx="0"/>
-          <a:fillRef idx="0"/>
-          <a:effectRef idx="0"/>
-          <a:fontRef idx="minor"/>
-        </p:style>
-        <p:txBody>
-          <a:bodyPr wrap="none" lIns="90000" rIns="90000" tIns="45000" bIns="45000"/>
-          <a:p>
-            <a:pPr algn="ctr">
-              <a:lnSpc>
-                <a:spcPct val="100000"/>
-              </a:lnSpc>
-            </a:pPr>
-            <a:r>
-              <a:rPr b="0" lang="en-GB" sz="3500" spc="-1" strike="noStrike">
-                <a:solidFill>
-                  <a:srgbClr val="000000"/>
-                </a:solidFill>
-                <a:latin typeface="Arial"/>
-                <a:ea typeface="DejaVu Sans"/>
-              </a:rPr>
               <a:t>=</a:t>
             </a:r>
-            <a:endParaRPr b="0" lang="en-GB" sz="3500" spc="-1" strike="noStrike">
-              <a:latin typeface="Arial"/>
-            </a:endParaRPr>
-          </a:p>
-        </p:txBody>
-      </p:sp>
-      <p:sp>
-        <p:nvSpPr>
-          <p:cNvPr id="174" name="CustomShape 3"/>
-          <p:cNvSpPr/>
-          <p:nvPr/>
-        </p:nvSpPr>
-        <p:spPr>
-          <a:xfrm>
-            <a:off x="6598080" y="3176640"/>
-            <a:ext cx="1316880" cy="698760"/>
-          </a:xfrm>
-          <a:prstGeom prst="rect">
-            <a:avLst/>
-          </a:prstGeom>
-          <a:noFill/>
-          <a:ln>
-            <a:noFill/>
-          </a:ln>
-        </p:spPr>
-        <p:style>
-          <a:lnRef idx="0"/>
-          <a:fillRef idx="0"/>
-          <a:effectRef idx="0"/>
-          <a:fontRef idx="minor"/>
-        </p:style>
-        <p:txBody>
-          <a:bodyPr wrap="none" lIns="90000" rIns="90000" tIns="45000" bIns="45000"/>
-          <a:p>
-            <a:pPr algn="ctr">
-              <a:lnSpc>
-                <a:spcPct val="100000"/>
-              </a:lnSpc>
-            </a:pPr>
-            <a:r>
-              <a:rPr b="0" lang="en-GB" sz="4000" spc="-1" strike="noStrike">
-                <a:solidFill>
-                  <a:srgbClr val="000000"/>
-                </a:solidFill>
-                <a:latin typeface="Arial"/>
-                <a:ea typeface="DejaVu Sans"/>
-              </a:rPr>
-              <a:t>Train</a:t>
-            </a:r>
-            <a:endParaRPr b="0" lang="en-GB" sz="4000" spc="-1" strike="noStrike">
-              <a:latin typeface="Arial"/>
-            </a:endParaRPr>
-          </a:p>
-        </p:txBody>
-      </p:sp>
-      <p:sp>
-        <p:nvSpPr>
-          <p:cNvPr id="175" name="CustomShape 4"/>
-          <p:cNvSpPr/>
-          <p:nvPr/>
-        </p:nvSpPr>
-        <p:spPr>
-          <a:xfrm>
-            <a:off x="3587400" y="1259640"/>
-            <a:ext cx="3884760" cy="622800"/>
-          </a:xfrm>
-          <a:prstGeom prst="rect">
-            <a:avLst/>
-          </a:prstGeom>
-          <a:noFill/>
-          <a:ln>
-            <a:noFill/>
-          </a:ln>
-        </p:spPr>
-        <p:style>
-          <a:lnRef idx="0"/>
-          <a:fillRef idx="0"/>
-          <a:effectRef idx="0"/>
-          <a:fontRef idx="minor"/>
-        </p:style>
-        <p:txBody>
-          <a:bodyPr wrap="none" lIns="90000" rIns="90000" tIns="45000" bIns="45000"/>
-          <a:p>
-            <a:pPr algn="ctr">
-              <a:lnSpc>
-                <a:spcPct val="100000"/>
-              </a:lnSpc>
-            </a:pPr>
-            <a:r>
-              <a:rPr b="0" lang="en-GB" sz="3500" spc="-1" strike="noStrike">
-                <a:solidFill>
-                  <a:srgbClr val="000000"/>
-                </a:solidFill>
-                <a:latin typeface="Arial"/>
-                <a:ea typeface="DejaVu Sans"/>
-              </a:rPr>
-              <a:t>Essaye de retenir !</a:t>
-            </a:r>
-            <a:endParaRPr b="0" lang="en-GB" sz="3500" spc="-1" strike="noStrike">
+            <a:endParaRPr b="0" lang="en-GB" sz="3000" spc="-1" strike="noStrike">
               <a:latin typeface="Arial"/>
             </a:endParaRPr>
           </a:p>
@@ -6041,6 +5659,541 @@
 </p:sld>
 </file>
 
+<file path=ppt/slides/slide11.xml><?xml version="1.0" encoding="utf-8"?>
+<p:sld xmlns:a="http://schemas.openxmlformats.org/drawingml/2006/main" xmlns:p="http://schemas.openxmlformats.org/presentationml/2006/main" xmlns:r="http://schemas.openxmlformats.org/officeDocument/2006/relationships" xmlns:p14="http://schemas.microsoft.com/office/powerpoint/2010/main" xmlns:p15="http://schemas.microsoft.com/office/powerpoint/2012/main" xmlns:mc="http://schemas.openxmlformats.org/markup-compatibility/2006">
+  <p:cSld>
+    <p:spTree>
+      <p:nvGrpSpPr>
+        <p:cNvPr id="1" name=""/>
+        <p:cNvGrpSpPr/>
+        <p:nvPr/>
+      </p:nvGrpSpPr>
+      <p:grpSpPr>
+        <a:xfrm>
+          <a:off x="0" y="0"/>
+          <a:ext cx="0" cy="0"/>
+          <a:chOff x="0" y="0"/>
+          <a:chExt cx="0" cy="0"/>
+        </a:xfrm>
+      </p:grpSpPr>
+      <p:sp>
+        <p:nvSpPr>
+          <p:cNvPr id="168" name="CustomShape 1"/>
+          <p:cNvSpPr/>
+          <p:nvPr/>
+        </p:nvSpPr>
+        <p:spPr>
+          <a:xfrm>
+            <a:off x="1308240" y="997200"/>
+            <a:ext cx="8940960" cy="1917360"/>
+          </a:xfrm>
+          <a:prstGeom prst="rect">
+            <a:avLst/>
+          </a:prstGeom>
+          <a:noFill/>
+          <a:ln>
+            <a:noFill/>
+          </a:ln>
+        </p:spPr>
+        <p:style>
+          <a:lnRef idx="0"/>
+          <a:fillRef idx="0"/>
+          <a:effectRef idx="0"/>
+          <a:fontRef idx="minor"/>
+        </p:style>
+        <p:txBody>
+          <a:bodyPr wrap="none" lIns="90000" rIns="90000" tIns="45000" bIns="45000"/>
+          <a:p>
+            <a:pPr algn="ctr">
+              <a:lnSpc>
+                <a:spcPct val="100000"/>
+              </a:lnSpc>
+            </a:pPr>
+            <a:r>
+              <a:rPr b="0" lang="en-GB" sz="4000" spc="-1" strike="noStrike">
+                <a:solidFill>
+                  <a:srgbClr val="000000"/>
+                </a:solidFill>
+                <a:latin typeface="Arial"/>
+                <a:ea typeface="DejaVu Sans"/>
+              </a:rPr>
+              <a:t>Ooups ! </a:t>
+            </a:r>
+            <a:endParaRPr b="0" lang="en-GB" sz="4000" spc="-1" strike="noStrike">
+              <a:latin typeface="Arial"/>
+            </a:endParaRPr>
+          </a:p>
+          <a:p>
+            <a:pPr algn="ctr">
+              <a:lnSpc>
+                <a:spcPct val="100000"/>
+              </a:lnSpc>
+            </a:pPr>
+            <a:endParaRPr b="0" lang="en-GB" sz="4000" spc="-1" strike="noStrike">
+              <a:latin typeface="Arial"/>
+            </a:endParaRPr>
+          </a:p>
+          <a:p>
+            <a:pPr algn="ctr">
+              <a:lnSpc>
+                <a:spcPct val="100000"/>
+              </a:lnSpc>
+            </a:pPr>
+            <a:r>
+              <a:rPr b="0" lang="en-GB" sz="4000" spc="-1" strike="noStrike">
+                <a:solidFill>
+                  <a:srgbClr val="000000"/>
+                </a:solidFill>
+                <a:latin typeface="Arial"/>
+                <a:ea typeface="DejaVu Sans"/>
+              </a:rPr>
+              <a:t>Tu n’as pas écrit le mot correctement...</a:t>
+            </a:r>
+            <a:endParaRPr b="0" lang="en-GB" sz="4000" spc="-1" strike="noStrike">
+              <a:latin typeface="Arial"/>
+            </a:endParaRPr>
+          </a:p>
+        </p:txBody>
+      </p:sp>
+      <p:sp>
+        <p:nvSpPr>
+          <p:cNvPr id="169" name="CustomShape 2"/>
+          <p:cNvSpPr/>
+          <p:nvPr/>
+        </p:nvSpPr>
+        <p:spPr>
+          <a:xfrm>
+            <a:off x="5335200" y="3851280"/>
+            <a:ext cx="440280" cy="622440"/>
+          </a:xfrm>
+          <a:prstGeom prst="rect">
+            <a:avLst/>
+          </a:prstGeom>
+          <a:noFill/>
+          <a:ln>
+            <a:noFill/>
+          </a:ln>
+        </p:spPr>
+        <p:style>
+          <a:lnRef idx="0"/>
+          <a:fillRef idx="0"/>
+          <a:effectRef idx="0"/>
+          <a:fontRef idx="minor"/>
+        </p:style>
+        <p:txBody>
+          <a:bodyPr wrap="none" lIns="90000" rIns="90000" tIns="45000" bIns="45000"/>
+          <a:p>
+            <a:pPr algn="ctr">
+              <a:lnSpc>
+                <a:spcPct val="100000"/>
+              </a:lnSpc>
+            </a:pPr>
+            <a:r>
+              <a:rPr b="0" lang="en-GB" sz="3500" spc="-1" strike="noStrike">
+                <a:solidFill>
+                  <a:srgbClr val="000000"/>
+                </a:solidFill>
+                <a:latin typeface="Arial"/>
+                <a:ea typeface="DejaVu Sans"/>
+              </a:rPr>
+              <a:t>=</a:t>
+            </a:r>
+            <a:endParaRPr b="0" lang="en-GB" sz="3500" spc="-1" strike="noStrike">
+              <a:latin typeface="Arial"/>
+            </a:endParaRPr>
+          </a:p>
+        </p:txBody>
+      </p:sp>
+      <p:sp>
+        <p:nvSpPr>
+          <p:cNvPr id="170" name="CustomShape 3"/>
+          <p:cNvSpPr/>
+          <p:nvPr/>
+        </p:nvSpPr>
+        <p:spPr>
+          <a:xfrm>
+            <a:off x="6288120" y="3429000"/>
+            <a:ext cx="1158120" cy="393840"/>
+          </a:xfrm>
+          <a:prstGeom prst="rect">
+            <a:avLst/>
+          </a:prstGeom>
+          <a:noFill/>
+          <a:ln>
+            <a:noFill/>
+          </a:ln>
+        </p:spPr>
+        <p:style>
+          <a:lnRef idx="0"/>
+          <a:fillRef idx="0"/>
+          <a:effectRef idx="0"/>
+          <a:fontRef idx="minor"/>
+        </p:style>
+        <p:txBody>
+          <a:bodyPr wrap="none" lIns="90000" rIns="90000" tIns="45000" bIns="45000"/>
+          <a:p>
+            <a:pPr>
+              <a:lnSpc>
+                <a:spcPct val="100000"/>
+              </a:lnSpc>
+            </a:pPr>
+            <a:r>
+              <a:rPr b="0" lang="en-GB" sz="2000" spc="-1" strike="noStrike">
+                <a:solidFill>
+                  <a:srgbClr val="000000"/>
+                </a:solidFill>
+                <a:latin typeface="Arial"/>
+                <a:ea typeface="DejaVu Sans"/>
+              </a:rPr>
+              <a:t>Français</a:t>
+            </a:r>
+            <a:endParaRPr b="0" lang="en-GB" sz="2000" spc="-1" strike="noStrike">
+              <a:latin typeface="Arial"/>
+            </a:endParaRPr>
+          </a:p>
+        </p:txBody>
+      </p:sp>
+      <p:sp>
+        <p:nvSpPr>
+          <p:cNvPr id="171" name="CustomShape 4"/>
+          <p:cNvSpPr/>
+          <p:nvPr/>
+        </p:nvSpPr>
+        <p:spPr>
+          <a:xfrm>
+            <a:off x="3531960" y="3450960"/>
+            <a:ext cx="1200600" cy="393840"/>
+          </a:xfrm>
+          <a:prstGeom prst="rect">
+            <a:avLst/>
+          </a:prstGeom>
+          <a:noFill/>
+          <a:ln>
+            <a:noFill/>
+          </a:ln>
+        </p:spPr>
+        <p:style>
+          <a:lnRef idx="0"/>
+          <a:fillRef idx="0"/>
+          <a:effectRef idx="0"/>
+          <a:fontRef idx="minor"/>
+        </p:style>
+        <p:txBody>
+          <a:bodyPr wrap="none" lIns="90000" rIns="90000" tIns="45000" bIns="45000"/>
+          <a:p>
+            <a:pPr>
+              <a:lnSpc>
+                <a:spcPct val="100000"/>
+              </a:lnSpc>
+            </a:pPr>
+            <a:r>
+              <a:rPr b="0" lang="en-GB" sz="2000" spc="-1" strike="noStrike">
+                <a:solidFill>
+                  <a:srgbClr val="000000"/>
+                </a:solidFill>
+                <a:latin typeface="Arial"/>
+                <a:ea typeface="DejaVu Sans"/>
+              </a:rPr>
+              <a:t>Hongrois</a:t>
+            </a:r>
+            <a:endParaRPr b="0" lang="en-GB" sz="2000" spc="-1" strike="noStrike">
+              <a:latin typeface="Arial"/>
+            </a:endParaRPr>
+          </a:p>
+        </p:txBody>
+      </p:sp>
+      <p:sp>
+        <p:nvSpPr>
+          <p:cNvPr id="172" name="CustomShape 5"/>
+          <p:cNvSpPr/>
+          <p:nvPr/>
+        </p:nvSpPr>
+        <p:spPr>
+          <a:xfrm>
+            <a:off x="1576440" y="5229720"/>
+            <a:ext cx="7958160" cy="622440"/>
+          </a:xfrm>
+          <a:prstGeom prst="rect">
+            <a:avLst/>
+          </a:prstGeom>
+          <a:noFill/>
+          <a:ln>
+            <a:noFill/>
+          </a:ln>
+        </p:spPr>
+        <p:style>
+          <a:lnRef idx="0"/>
+          <a:fillRef idx="0"/>
+          <a:effectRef idx="0"/>
+          <a:fontRef idx="minor"/>
+        </p:style>
+        <p:txBody>
+          <a:bodyPr wrap="none" lIns="90000" rIns="90000" tIns="45000" bIns="45000"/>
+          <a:p>
+            <a:pPr algn="ctr">
+              <a:lnSpc>
+                <a:spcPct val="100000"/>
+              </a:lnSpc>
+            </a:pPr>
+            <a:r>
+              <a:rPr b="0" lang="en-GB" sz="3500" spc="-1" strike="noStrike">
+                <a:solidFill>
+                  <a:srgbClr val="000000"/>
+                </a:solidFill>
+                <a:latin typeface="Arial"/>
+                <a:ea typeface="DejaVu Sans"/>
+              </a:rPr>
+              <a:t>Appuie sur une touche pour continuer !</a:t>
+            </a:r>
+            <a:endParaRPr b="0" lang="en-GB" sz="3500" spc="-1" strike="noStrike">
+              <a:latin typeface="Arial"/>
+            </a:endParaRPr>
+          </a:p>
+        </p:txBody>
+      </p:sp>
+    </p:spTree>
+  </p:cSld>
+</p:sld>
+</file>
+
+<file path=ppt/slides/slide12.xml><?xml version="1.0" encoding="utf-8"?>
+<p:sld xmlns:a="http://schemas.openxmlformats.org/drawingml/2006/main" xmlns:p="http://schemas.openxmlformats.org/presentationml/2006/main" xmlns:r="http://schemas.openxmlformats.org/officeDocument/2006/relationships" xmlns:p14="http://schemas.microsoft.com/office/powerpoint/2010/main" xmlns:p15="http://schemas.microsoft.com/office/powerpoint/2012/main" xmlns:mc="http://schemas.openxmlformats.org/markup-compatibility/2006">
+  <p:cSld>
+    <p:spTree>
+      <p:nvGrpSpPr>
+        <p:cNvPr id="1" name=""/>
+        <p:cNvGrpSpPr/>
+        <p:nvPr/>
+      </p:nvGrpSpPr>
+      <p:grpSpPr>
+        <a:xfrm>
+          <a:off x="0" y="0"/>
+          <a:ext cx="0" cy="0"/>
+          <a:chOff x="0" y="0"/>
+          <a:chExt cx="0" cy="0"/>
+        </a:xfrm>
+      </p:grpSpPr>
+      <p:sp>
+        <p:nvSpPr>
+          <p:cNvPr id="173" name="CustomShape 1"/>
+          <p:cNvSpPr/>
+          <p:nvPr/>
+        </p:nvSpPr>
+        <p:spPr>
+          <a:xfrm>
+            <a:off x="544680" y="573120"/>
+            <a:ext cx="10738080" cy="698400"/>
+          </a:xfrm>
+          <a:prstGeom prst="rect">
+            <a:avLst/>
+          </a:prstGeom>
+          <a:noFill/>
+          <a:ln>
+            <a:noFill/>
+          </a:ln>
+        </p:spPr>
+        <p:style>
+          <a:lnRef idx="0"/>
+          <a:fillRef idx="0"/>
+          <a:effectRef idx="0"/>
+          <a:fontRef idx="minor"/>
+        </p:style>
+        <p:txBody>
+          <a:bodyPr wrap="none" lIns="90000" rIns="90000" tIns="45000" bIns="45000"/>
+          <a:p>
+            <a:pPr algn="ctr">
+              <a:lnSpc>
+                <a:spcPct val="100000"/>
+              </a:lnSpc>
+            </a:pPr>
+            <a:r>
+              <a:rPr b="0" lang="en-GB" sz="4000" spc="-1" strike="noStrike">
+                <a:solidFill>
+                  <a:srgbClr val="000000"/>
+                </a:solidFill>
+                <a:latin typeface="Arial"/>
+                <a:ea typeface="DejaVu Sans"/>
+              </a:rPr>
+              <a:t>On va te présenter 15 paires de mots à la suite</a:t>
+            </a:r>
+            <a:endParaRPr b="0" lang="en-GB" sz="4000" spc="-1" strike="noStrike">
+              <a:latin typeface="Arial"/>
+            </a:endParaRPr>
+          </a:p>
+        </p:txBody>
+      </p:sp>
+      <p:sp>
+        <p:nvSpPr>
+          <p:cNvPr id="174" name="CustomShape 2"/>
+          <p:cNvSpPr/>
+          <p:nvPr/>
+        </p:nvSpPr>
+        <p:spPr>
+          <a:xfrm>
+            <a:off x="1671840" y="5653800"/>
+            <a:ext cx="8328600" cy="622440"/>
+          </a:xfrm>
+          <a:prstGeom prst="rect">
+            <a:avLst/>
+          </a:prstGeom>
+          <a:noFill/>
+          <a:ln>
+            <a:noFill/>
+          </a:ln>
+        </p:spPr>
+        <p:style>
+          <a:lnRef idx="0"/>
+          <a:fillRef idx="0"/>
+          <a:effectRef idx="0"/>
+          <a:fontRef idx="minor"/>
+        </p:style>
+        <p:txBody>
+          <a:bodyPr wrap="none" lIns="90000" rIns="90000" tIns="45000" bIns="45000"/>
+          <a:p>
+            <a:pPr algn="ctr">
+              <a:lnSpc>
+                <a:spcPct val="100000"/>
+              </a:lnSpc>
+            </a:pPr>
+            <a:r>
+              <a:rPr b="0" lang="en-GB" sz="3500" spc="-1" strike="noStrike">
+                <a:solidFill>
+                  <a:srgbClr val="000000"/>
+                </a:solidFill>
+                <a:latin typeface="Arial"/>
+                <a:ea typeface="DejaVu Sans"/>
+              </a:rPr>
+              <a:t>Appuie sur une touche pour commencer !</a:t>
+            </a:r>
+            <a:endParaRPr b="0" lang="en-GB" sz="3500" spc="-1" strike="noStrike">
+              <a:latin typeface="Arial"/>
+            </a:endParaRPr>
+          </a:p>
+        </p:txBody>
+      </p:sp>
+      <p:sp>
+        <p:nvSpPr>
+          <p:cNvPr id="175" name="CustomShape 3"/>
+          <p:cNvSpPr/>
+          <p:nvPr/>
+        </p:nvSpPr>
+        <p:spPr>
+          <a:xfrm>
+            <a:off x="1020240" y="1758600"/>
+            <a:ext cx="9786960" cy="622440"/>
+          </a:xfrm>
+          <a:prstGeom prst="rect">
+            <a:avLst/>
+          </a:prstGeom>
+          <a:noFill/>
+          <a:ln>
+            <a:noFill/>
+          </a:ln>
+        </p:spPr>
+        <p:style>
+          <a:lnRef idx="0"/>
+          <a:fillRef idx="0"/>
+          <a:effectRef idx="0"/>
+          <a:fontRef idx="minor"/>
+        </p:style>
+        <p:txBody>
+          <a:bodyPr wrap="none" lIns="90000" rIns="90000" tIns="45000" bIns="45000"/>
+          <a:p>
+            <a:pPr algn="ctr">
+              <a:lnSpc>
+                <a:spcPct val="100000"/>
+              </a:lnSpc>
+            </a:pPr>
+            <a:r>
+              <a:rPr b="0" lang="en-GB" sz="3500" spc="-1" strike="noStrike">
+                <a:solidFill>
+                  <a:srgbClr val="000000"/>
+                </a:solidFill>
+                <a:latin typeface="Arial"/>
+                <a:ea typeface="DejaVu Sans"/>
+              </a:rPr>
+              <a:t>Essaye de retenir la traduction de tous les mots !</a:t>
+            </a:r>
+            <a:endParaRPr b="0" lang="en-GB" sz="3500" spc="-1" strike="noStrike">
+              <a:latin typeface="Arial"/>
+            </a:endParaRPr>
+          </a:p>
+        </p:txBody>
+      </p:sp>
+      <p:sp>
+        <p:nvSpPr>
+          <p:cNvPr id="176" name="CustomShape 4"/>
+          <p:cNvSpPr/>
+          <p:nvPr/>
+        </p:nvSpPr>
+        <p:spPr>
+          <a:xfrm>
+            <a:off x="1449720" y="3183120"/>
+            <a:ext cx="8773560" cy="1155960"/>
+          </a:xfrm>
+          <a:prstGeom prst="rect">
+            <a:avLst/>
+          </a:prstGeom>
+          <a:noFill/>
+          <a:ln>
+            <a:noFill/>
+          </a:ln>
+        </p:spPr>
+        <p:style>
+          <a:lnRef idx="0"/>
+          <a:fillRef idx="0"/>
+          <a:effectRef idx="0"/>
+          <a:fontRef idx="minor"/>
+        </p:style>
+        <p:txBody>
+          <a:bodyPr wrap="none" lIns="90000" rIns="90000" tIns="45000" bIns="45000"/>
+          <a:p>
+            <a:pPr algn="ctr">
+              <a:lnSpc>
+                <a:spcPct val="100000"/>
+              </a:lnSpc>
+            </a:pPr>
+            <a:r>
+              <a:rPr b="0" lang="en-GB" sz="3500" spc="-1" strike="noStrike">
+                <a:solidFill>
+                  <a:srgbClr val="000000"/>
+                </a:solidFill>
+                <a:latin typeface="Arial"/>
+                <a:ea typeface="DejaVu Sans"/>
+              </a:rPr>
+              <a:t>Plus tard, on te donnera le mot Hongrois et </a:t>
+            </a:r>
+            <a:endParaRPr b="0" lang="en-GB" sz="3500" spc="-1" strike="noStrike">
+              <a:latin typeface="Arial"/>
+            </a:endParaRPr>
+          </a:p>
+          <a:p>
+            <a:pPr algn="ctr">
+              <a:lnSpc>
+                <a:spcPct val="100000"/>
+              </a:lnSpc>
+            </a:pPr>
+            <a:r>
+              <a:rPr b="0" lang="en-GB" sz="3500" spc="-1" strike="noStrike">
+                <a:solidFill>
+                  <a:srgbClr val="000000"/>
+                </a:solidFill>
+                <a:latin typeface="Arial"/>
+                <a:ea typeface="DejaVu Sans"/>
+              </a:rPr>
+              <a:t>tu devras écrire la traduction en français</a:t>
+            </a:r>
+            <a:endParaRPr b="0" lang="en-GB" sz="3500" spc="-1" strike="noStrike">
+              <a:latin typeface="Arial"/>
+            </a:endParaRPr>
+          </a:p>
+        </p:txBody>
+      </p:sp>
+    </p:spTree>
+  </p:cSld>
+</p:sld>
+</file>
+
 <file path=ppt/slides/slide13.xml><?xml version="1.0" encoding="utf-8"?>
 <p:sld xmlns:a="http://schemas.openxmlformats.org/drawingml/2006/main" xmlns:p="http://schemas.openxmlformats.org/presentationml/2006/main" xmlns:r="http://schemas.openxmlformats.org/officeDocument/2006/relationships" xmlns:p14="http://schemas.microsoft.com/office/powerpoint/2010/main" xmlns:p15="http://schemas.microsoft.com/office/powerpoint/2012/main" xmlns:mc="http://schemas.openxmlformats.org/markup-compatibility/2006">
   <p:cSld>
@@ -6060,14 +6213,14 @@
       </p:grpSpPr>
       <p:sp>
         <p:nvSpPr>
-          <p:cNvPr id="176" name="CustomShape 1"/>
+          <p:cNvPr id="177" name="CustomShape 1"/>
           <p:cNvSpPr/>
           <p:nvPr/>
         </p:nvSpPr>
         <p:spPr>
           <a:xfrm>
-            <a:off x="3535920" y="206640"/>
-            <a:ext cx="4669560" cy="698760"/>
+            <a:off x="544680" y="573120"/>
+            <a:ext cx="10738080" cy="698400"/>
           </a:xfrm>
           <a:prstGeom prst="rect">
             <a:avLst/>
@@ -6099,7 +6252,7 @@
                 <a:latin typeface="Arial"/>
                 <a:ea typeface="DejaVu Sans"/>
               </a:rPr>
-              <a:t>Bravo ! Tu as réussi</a:t>
+              <a:t>On va te présenter 40 paires de mots à la suite</a:t>
             </a:r>
             <a:endParaRPr b="0" lang="en-GB" sz="4000" spc="-1" strike="noStrike">
               <a:latin typeface="Arial"/>
@@ -6109,14 +6262,14 @@
       </p:sp>
       <p:sp>
         <p:nvSpPr>
-          <p:cNvPr id="177" name="CustomShape 2"/>
+          <p:cNvPr id="178" name="CustomShape 2"/>
           <p:cNvSpPr/>
           <p:nvPr/>
         </p:nvSpPr>
         <p:spPr>
           <a:xfrm>
-            <a:off x="3948480" y="1280880"/>
-            <a:ext cx="1153800" cy="546120"/>
+            <a:off x="1671840" y="5653800"/>
+            <a:ext cx="8328600" cy="622440"/>
           </a:xfrm>
           <a:prstGeom prst="rect">
             <a:avLst/>
@@ -6141,31 +6294,31 @@
               </a:lnSpc>
             </a:pPr>
             <a:r>
-              <a:rPr b="0" lang="en-GB" sz="3000" spc="-1" strike="noStrike">
+              <a:rPr b="0" lang="en-GB" sz="3500" spc="-1" strike="noStrike">
                 <a:solidFill>
                   <a:srgbClr val="000000"/>
                 </a:solidFill>
                 <a:latin typeface="Arial"/>
                 <a:ea typeface="DejaVu Sans"/>
               </a:rPr>
-              <a:t>Vonat</a:t>
-            </a:r>
-            <a:endParaRPr b="0" lang="en-GB" sz="3000" spc="-1" strike="noStrike">
-              <a:latin typeface="Arial"/>
-            </a:endParaRPr>
-          </a:p>
-        </p:txBody>
-      </p:sp>
-      <p:sp>
-        <p:nvSpPr>
-          <p:cNvPr id="178" name="CustomShape 3"/>
+              <a:t>Appuie sur une touche pour commencer !</a:t>
+            </a:r>
+            <a:endParaRPr b="0" lang="en-GB" sz="3500" spc="-1" strike="noStrike">
+              <a:latin typeface="Arial"/>
+            </a:endParaRPr>
+          </a:p>
+        </p:txBody>
+      </p:sp>
+      <p:sp>
+        <p:nvSpPr>
+          <p:cNvPr id="179" name="CustomShape 3"/>
           <p:cNvSpPr/>
           <p:nvPr/>
         </p:nvSpPr>
         <p:spPr>
           <a:xfrm>
-            <a:off x="6606360" y="1280880"/>
-            <a:ext cx="1033560" cy="546120"/>
+            <a:off x="1020240" y="1758600"/>
+            <a:ext cx="9786960" cy="622440"/>
           </a:xfrm>
           <a:prstGeom prst="rect">
             <a:avLst/>
@@ -6190,31 +6343,31 @@
               </a:lnSpc>
             </a:pPr>
             <a:r>
-              <a:rPr b="0" lang="en-GB" sz="3000" spc="-1" strike="noStrike">
+              <a:rPr b="0" lang="en-GB" sz="3500" spc="-1" strike="noStrike">
                 <a:solidFill>
                   <a:srgbClr val="000000"/>
                 </a:solidFill>
                 <a:latin typeface="Arial"/>
                 <a:ea typeface="DejaVu Sans"/>
               </a:rPr>
-              <a:t>Train</a:t>
-            </a:r>
-            <a:endParaRPr b="0" lang="en-GB" sz="3000" spc="-1" strike="noStrike">
-              <a:latin typeface="Arial"/>
-            </a:endParaRPr>
-          </a:p>
-        </p:txBody>
-      </p:sp>
-      <p:sp>
-        <p:nvSpPr>
-          <p:cNvPr id="179" name="CustomShape 4"/>
+              <a:t>Essaye de retenir la traduction de tous les mots !</a:t>
+            </a:r>
+            <a:endParaRPr b="0" lang="en-GB" sz="3500" spc="-1" strike="noStrike">
+              <a:latin typeface="Arial"/>
+            </a:endParaRPr>
+          </a:p>
+        </p:txBody>
+      </p:sp>
+      <p:sp>
+        <p:nvSpPr>
+          <p:cNvPr id="180" name="CustomShape 4"/>
           <p:cNvSpPr/>
           <p:nvPr/>
         </p:nvSpPr>
         <p:spPr>
           <a:xfrm>
-            <a:off x="5686200" y="1280880"/>
-            <a:ext cx="402480" cy="546120"/>
+            <a:off x="1449720" y="3183120"/>
+            <a:ext cx="8773560" cy="1155960"/>
           </a:xfrm>
           <a:prstGeom prst="rect">
             <a:avLst/>
@@ -6239,31 +6392,73 @@
               </a:lnSpc>
             </a:pPr>
             <a:r>
-              <a:rPr b="0" lang="en-GB" sz="3000" spc="-1" strike="noStrike">
+              <a:rPr b="0" lang="en-GB" sz="3500" spc="-1" strike="noStrike">
                 <a:solidFill>
                   <a:srgbClr val="000000"/>
                 </a:solidFill>
                 <a:latin typeface="Arial"/>
                 <a:ea typeface="DejaVu Sans"/>
               </a:rPr>
-              <a:t>=</a:t>
-            </a:r>
-            <a:endParaRPr b="0" lang="en-GB" sz="3000" spc="-1" strike="noStrike">
-              <a:latin typeface="Arial"/>
-            </a:endParaRPr>
-          </a:p>
-        </p:txBody>
-      </p:sp>
-      <p:sp>
-        <p:nvSpPr>
-          <p:cNvPr id="180" name="CustomShape 5"/>
+              <a:t>Plus tard, on te donnera le mot Hongrois et </a:t>
+            </a:r>
+            <a:endParaRPr b="0" lang="en-GB" sz="3500" spc="-1" strike="noStrike">
+              <a:latin typeface="Arial"/>
+            </a:endParaRPr>
+          </a:p>
+          <a:p>
+            <a:pPr algn="ctr">
+              <a:lnSpc>
+                <a:spcPct val="100000"/>
+              </a:lnSpc>
+            </a:pPr>
+            <a:r>
+              <a:rPr b="0" lang="en-GB" sz="3500" spc="-1" strike="noStrike">
+                <a:solidFill>
+                  <a:srgbClr val="000000"/>
+                </a:solidFill>
+                <a:latin typeface="Arial"/>
+                <a:ea typeface="DejaVu Sans"/>
+              </a:rPr>
+              <a:t>tu devras écrire la traduction en français</a:t>
+            </a:r>
+            <a:endParaRPr b="0" lang="en-GB" sz="3500" spc="-1" strike="noStrike">
+              <a:latin typeface="Arial"/>
+            </a:endParaRPr>
+          </a:p>
+        </p:txBody>
+      </p:sp>
+    </p:spTree>
+  </p:cSld>
+</p:sld>
+</file>
+
+<file path=ppt/slides/slide14.xml><?xml version="1.0" encoding="utf-8"?>
+<p:sld xmlns:a="http://schemas.openxmlformats.org/drawingml/2006/main" xmlns:p="http://schemas.openxmlformats.org/presentationml/2006/main" xmlns:r="http://schemas.openxmlformats.org/officeDocument/2006/relationships" xmlns:p14="http://schemas.microsoft.com/office/powerpoint/2010/main" xmlns:p15="http://schemas.microsoft.com/office/powerpoint/2012/main" xmlns:mc="http://schemas.openxmlformats.org/markup-compatibility/2006">
+  <p:cSld>
+    <p:spTree>
+      <p:nvGrpSpPr>
+        <p:cNvPr id="1" name=""/>
+        <p:cNvGrpSpPr/>
+        <p:nvPr/>
+      </p:nvGrpSpPr>
+      <p:grpSpPr>
+        <a:xfrm>
+          <a:off x="0" y="0"/>
+          <a:ext cx="0" cy="0"/>
+          <a:chOff x="0" y="0"/>
+          <a:chExt cx="0" cy="0"/>
+        </a:xfrm>
+      </p:grpSpPr>
+      <p:sp>
+        <p:nvSpPr>
+          <p:cNvPr id="181" name="CustomShape 1"/>
           <p:cNvSpPr/>
           <p:nvPr/>
         </p:nvSpPr>
         <p:spPr>
           <a:xfrm>
-            <a:off x="3446640" y="2112840"/>
-            <a:ext cx="5033880" cy="698760"/>
+            <a:off x="2952000" y="3176640"/>
+            <a:ext cx="1478160" cy="698400"/>
           </a:xfrm>
           <a:prstGeom prst="rect">
             <a:avLst/>
@@ -6295,7 +6490,7 @@
                 <a:latin typeface="Arial"/>
                 <a:ea typeface="DejaVu Sans"/>
               </a:rPr>
-              <a:t>Que souhaiterais-tu ?</a:t>
+              <a:t>Vonat</a:t>
             </a:r>
             <a:endParaRPr b="0" lang="en-GB" sz="4000" spc="-1" strike="noStrike">
               <a:latin typeface="Arial"/>
@@ -6305,14 +6500,14 @@
       </p:sp>
       <p:sp>
         <p:nvSpPr>
-          <p:cNvPr id="181" name="CustomShape 6"/>
+          <p:cNvPr id="182" name="CustomShape 2"/>
           <p:cNvSpPr/>
           <p:nvPr/>
         </p:nvSpPr>
         <p:spPr>
           <a:xfrm>
-            <a:off x="833400" y="3191760"/>
-            <a:ext cx="7371720" cy="546120"/>
+            <a:off x="5347800" y="3253680"/>
+            <a:ext cx="440280" cy="622440"/>
           </a:xfrm>
           <a:prstGeom prst="rect">
             <a:avLst/>
@@ -6337,31 +6532,31 @@
               </a:lnSpc>
             </a:pPr>
             <a:r>
-              <a:rPr b="0" lang="en-GB" sz="3000" spc="-1" strike="noStrike">
+              <a:rPr b="0" lang="en-GB" sz="3500" spc="-1" strike="noStrike">
                 <a:solidFill>
                   <a:srgbClr val="000000"/>
                 </a:solidFill>
                 <a:latin typeface="Arial"/>
                 <a:ea typeface="DejaVu Sans"/>
               </a:rPr>
-              <a:t>1- Je veux revoir la paire de mots plus tard</a:t>
-            </a:r>
-            <a:endParaRPr b="0" lang="en-GB" sz="3000" spc="-1" strike="noStrike">
-              <a:latin typeface="Arial"/>
-            </a:endParaRPr>
-          </a:p>
-        </p:txBody>
-      </p:sp>
-      <p:sp>
-        <p:nvSpPr>
-          <p:cNvPr id="182" name="CustomShape 7"/>
+              <a:t>=</a:t>
+            </a:r>
+            <a:endParaRPr b="0" lang="en-GB" sz="3500" spc="-1" strike="noStrike">
+              <a:latin typeface="Arial"/>
+            </a:endParaRPr>
+          </a:p>
+        </p:txBody>
+      </p:sp>
+      <p:sp>
+        <p:nvSpPr>
+          <p:cNvPr id="183" name="CustomShape 3"/>
           <p:cNvSpPr/>
           <p:nvPr/>
         </p:nvSpPr>
         <p:spPr>
           <a:xfrm>
-            <a:off x="837360" y="4023720"/>
-            <a:ext cx="7920360" cy="546120"/>
+            <a:off x="6598080" y="3176640"/>
+            <a:ext cx="1316520" cy="698400"/>
           </a:xfrm>
           <a:prstGeom prst="rect">
             <a:avLst/>
@@ -6386,31 +6581,31 @@
               </a:lnSpc>
             </a:pPr>
             <a:r>
-              <a:rPr b="0" lang="en-GB" sz="3000" spc="-1" strike="noStrike">
+              <a:rPr b="0" lang="en-GB" sz="4000" spc="-1" strike="noStrike">
                 <a:solidFill>
                   <a:srgbClr val="000000"/>
                 </a:solidFill>
                 <a:latin typeface="Arial"/>
                 <a:ea typeface="DejaVu Sans"/>
               </a:rPr>
-              <a:t>2- Je veux me re-tester avec la paire plus tard</a:t>
-            </a:r>
-            <a:endParaRPr b="0" lang="en-GB" sz="3000" spc="-1" strike="noStrike">
-              <a:latin typeface="Arial"/>
-            </a:endParaRPr>
-          </a:p>
-        </p:txBody>
-      </p:sp>
-      <p:sp>
-        <p:nvSpPr>
-          <p:cNvPr id="183" name="CustomShape 8"/>
+              <a:t>Train</a:t>
+            </a:r>
+            <a:endParaRPr b="0" lang="en-GB" sz="4000" spc="-1" strike="noStrike">
+              <a:latin typeface="Arial"/>
+            </a:endParaRPr>
+          </a:p>
+        </p:txBody>
+      </p:sp>
+      <p:sp>
+        <p:nvSpPr>
+          <p:cNvPr id="184" name="CustomShape 4"/>
           <p:cNvSpPr/>
           <p:nvPr/>
         </p:nvSpPr>
         <p:spPr>
           <a:xfrm>
-            <a:off x="838800" y="4855680"/>
-            <a:ext cx="8258760" cy="546120"/>
+            <a:off x="3587400" y="1259640"/>
+            <a:ext cx="3884400" cy="622440"/>
           </a:xfrm>
           <a:prstGeom prst="rect">
             <a:avLst/>
@@ -6435,65 +6630,16 @@
               </a:lnSpc>
             </a:pPr>
             <a:r>
-              <a:rPr b="0" lang="en-GB" sz="3000" spc="-1" strike="noStrike">
+              <a:rPr b="0" lang="en-GB" sz="3500" spc="-1" strike="noStrike">
                 <a:solidFill>
                   <a:srgbClr val="000000"/>
                 </a:solidFill>
                 <a:latin typeface="Arial"/>
                 <a:ea typeface="DejaVu Sans"/>
               </a:rPr>
-              <a:t>3- Je ne veux pas revoir la paire ni me re-tester </a:t>
-            </a:r>
-            <a:endParaRPr b="0" lang="en-GB" sz="3000" spc="-1" strike="noStrike">
-              <a:latin typeface="Arial"/>
-            </a:endParaRPr>
-          </a:p>
-        </p:txBody>
-      </p:sp>
-      <p:sp>
-        <p:nvSpPr>
-          <p:cNvPr id="184" name="CustomShape 9"/>
-          <p:cNvSpPr/>
-          <p:nvPr/>
-        </p:nvSpPr>
-        <p:spPr>
-          <a:xfrm>
-            <a:off x="3855240" y="5780880"/>
-            <a:ext cx="4473000" cy="546120"/>
-          </a:xfrm>
-          <a:prstGeom prst="rect">
-            <a:avLst/>
-          </a:prstGeom>
-          <a:noFill/>
-          <a:ln>
-            <a:noFill/>
-          </a:ln>
-        </p:spPr>
-        <p:style>
-          <a:lnRef idx="0"/>
-          <a:fillRef idx="0"/>
-          <a:effectRef idx="0"/>
-          <a:fontRef idx="minor"/>
-        </p:style>
-        <p:txBody>
-          <a:bodyPr wrap="none" lIns="90000" rIns="90000" tIns="45000" bIns="45000"/>
-          <a:p>
-            <a:pPr algn="ctr">
-              <a:lnSpc>
-                <a:spcPct val="100000"/>
-              </a:lnSpc>
-            </a:pPr>
-            <a:r>
-              <a:rPr b="0" lang="en-GB" sz="3000" spc="-1" strike="noStrike">
-                <a:solidFill>
-                  <a:srgbClr val="000000"/>
-                </a:solidFill>
-                <a:latin typeface="Arial"/>
-                <a:ea typeface="DejaVu Sans"/>
-              </a:rPr>
-              <a:t>Tape ton choix (1, 2 ou 3)</a:t>
-            </a:r>
-            <a:endParaRPr b="0" lang="en-GB" sz="3000" spc="-1" strike="noStrike">
+              <a:t>Essaye de retenir !</a:t>
+            </a:r>
+            <a:endParaRPr b="0" lang="en-GB" sz="3500" spc="-1" strike="noStrike">
               <a:latin typeface="Arial"/>
             </a:endParaRPr>
           </a:p>
@@ -6531,371 +6677,6 @@
 </p:sld>
 </file>
 
-<file path=ppt/slides/slide14.xml><?xml version="1.0" encoding="utf-8"?>
-<p:sld xmlns:a="http://schemas.openxmlformats.org/drawingml/2006/main" xmlns:p="http://schemas.openxmlformats.org/presentationml/2006/main" xmlns:r="http://schemas.openxmlformats.org/officeDocument/2006/relationships" xmlns:p14="http://schemas.microsoft.com/office/powerpoint/2010/main" xmlns:p15="http://schemas.microsoft.com/office/powerpoint/2012/main" xmlns:mc="http://schemas.openxmlformats.org/markup-compatibility/2006">
-  <p:cSld>
-    <p:spTree>
-      <p:nvGrpSpPr>
-        <p:cNvPr id="1" name=""/>
-        <p:cNvGrpSpPr/>
-        <p:nvPr/>
-      </p:nvGrpSpPr>
-      <p:grpSpPr>
-        <a:xfrm>
-          <a:off x="0" y="0"/>
-          <a:ext cx="0" cy="0"/>
-          <a:chOff x="0" y="0"/>
-          <a:chExt cx="0" cy="0"/>
-        </a:xfrm>
-      </p:grpSpPr>
-      <p:sp>
-        <p:nvSpPr>
-          <p:cNvPr id="185" name="CustomShape 1"/>
-          <p:cNvSpPr/>
-          <p:nvPr/>
-        </p:nvSpPr>
-        <p:spPr>
-          <a:xfrm>
-            <a:off x="3535560" y="206640"/>
-            <a:ext cx="4669560" cy="698760"/>
-          </a:xfrm>
-          <a:prstGeom prst="rect">
-            <a:avLst/>
-          </a:prstGeom>
-          <a:noFill/>
-          <a:ln>
-            <a:noFill/>
-          </a:ln>
-        </p:spPr>
-        <p:style>
-          <a:lnRef idx="0"/>
-          <a:fillRef idx="0"/>
-          <a:effectRef idx="0"/>
-          <a:fontRef idx="minor"/>
-        </p:style>
-        <p:txBody>
-          <a:bodyPr wrap="none" lIns="90000" rIns="90000" tIns="45000" bIns="45000"/>
-          <a:p>
-            <a:pPr algn="ctr">
-              <a:lnSpc>
-                <a:spcPct val="100000"/>
-              </a:lnSpc>
-            </a:pPr>
-            <a:r>
-              <a:rPr b="0" lang="en-GB" sz="4000" spc="-1" strike="noStrike">
-                <a:solidFill>
-                  <a:srgbClr val="000000"/>
-                </a:solidFill>
-                <a:latin typeface="Arial"/>
-                <a:ea typeface="DejaVu Sans"/>
-              </a:rPr>
-              <a:t>Bravo ! Tu as réussi</a:t>
-            </a:r>
-            <a:endParaRPr b="0" lang="en-GB" sz="4000" spc="-1" strike="noStrike">
-              <a:latin typeface="Arial"/>
-            </a:endParaRPr>
-          </a:p>
-        </p:txBody>
-      </p:sp>
-      <p:sp>
-        <p:nvSpPr>
-          <p:cNvPr id="186" name="CustomShape 2"/>
-          <p:cNvSpPr/>
-          <p:nvPr/>
-        </p:nvSpPr>
-        <p:spPr>
-          <a:xfrm>
-            <a:off x="5685840" y="1280880"/>
-            <a:ext cx="402480" cy="546120"/>
-          </a:xfrm>
-          <a:prstGeom prst="rect">
-            <a:avLst/>
-          </a:prstGeom>
-          <a:noFill/>
-          <a:ln>
-            <a:noFill/>
-          </a:ln>
-        </p:spPr>
-        <p:style>
-          <a:lnRef idx="0"/>
-          <a:fillRef idx="0"/>
-          <a:effectRef idx="0"/>
-          <a:fontRef idx="minor"/>
-        </p:style>
-        <p:txBody>
-          <a:bodyPr wrap="none" lIns="90000" rIns="90000" tIns="45000" bIns="45000"/>
-          <a:p>
-            <a:pPr algn="ctr">
-              <a:lnSpc>
-                <a:spcPct val="100000"/>
-              </a:lnSpc>
-            </a:pPr>
-            <a:r>
-              <a:rPr b="0" lang="en-GB" sz="3000" spc="-1" strike="noStrike">
-                <a:solidFill>
-                  <a:srgbClr val="000000"/>
-                </a:solidFill>
-                <a:latin typeface="Arial"/>
-                <a:ea typeface="DejaVu Sans"/>
-              </a:rPr>
-              <a:t>=</a:t>
-            </a:r>
-            <a:endParaRPr b="0" lang="en-GB" sz="3000" spc="-1" strike="noStrike">
-              <a:latin typeface="Arial"/>
-            </a:endParaRPr>
-          </a:p>
-        </p:txBody>
-      </p:sp>
-      <p:sp>
-        <p:nvSpPr>
-          <p:cNvPr id="187" name="CustomShape 3"/>
-          <p:cNvSpPr/>
-          <p:nvPr/>
-        </p:nvSpPr>
-        <p:spPr>
-          <a:xfrm>
-            <a:off x="3446280" y="2112840"/>
-            <a:ext cx="5033880" cy="698760"/>
-          </a:xfrm>
-          <a:prstGeom prst="rect">
-            <a:avLst/>
-          </a:prstGeom>
-          <a:noFill/>
-          <a:ln>
-            <a:noFill/>
-          </a:ln>
-        </p:spPr>
-        <p:style>
-          <a:lnRef idx="0"/>
-          <a:fillRef idx="0"/>
-          <a:effectRef idx="0"/>
-          <a:fontRef idx="minor"/>
-        </p:style>
-        <p:txBody>
-          <a:bodyPr wrap="none" lIns="90000" rIns="90000" tIns="45000" bIns="45000"/>
-          <a:p>
-            <a:pPr algn="ctr">
-              <a:lnSpc>
-                <a:spcPct val="100000"/>
-              </a:lnSpc>
-            </a:pPr>
-            <a:r>
-              <a:rPr b="0" lang="en-GB" sz="4000" spc="-1" strike="noStrike">
-                <a:solidFill>
-                  <a:srgbClr val="000000"/>
-                </a:solidFill>
-                <a:latin typeface="Arial"/>
-                <a:ea typeface="DejaVu Sans"/>
-              </a:rPr>
-              <a:t>Que souhaiterais-tu ?</a:t>
-            </a:r>
-            <a:endParaRPr b="0" lang="en-GB" sz="4000" spc="-1" strike="noStrike">
-              <a:latin typeface="Arial"/>
-            </a:endParaRPr>
-          </a:p>
-        </p:txBody>
-      </p:sp>
-      <p:sp>
-        <p:nvSpPr>
-          <p:cNvPr id="188" name="CustomShape 4"/>
-          <p:cNvSpPr/>
-          <p:nvPr/>
-        </p:nvSpPr>
-        <p:spPr>
-          <a:xfrm>
-            <a:off x="833040" y="3191760"/>
-            <a:ext cx="7371720" cy="546120"/>
-          </a:xfrm>
-          <a:prstGeom prst="rect">
-            <a:avLst/>
-          </a:prstGeom>
-          <a:noFill/>
-          <a:ln>
-            <a:noFill/>
-          </a:ln>
-        </p:spPr>
-        <p:style>
-          <a:lnRef idx="0"/>
-          <a:fillRef idx="0"/>
-          <a:effectRef idx="0"/>
-          <a:fontRef idx="minor"/>
-        </p:style>
-        <p:txBody>
-          <a:bodyPr wrap="none" lIns="90000" rIns="90000" tIns="45000" bIns="45000"/>
-          <a:p>
-            <a:pPr algn="ctr">
-              <a:lnSpc>
-                <a:spcPct val="100000"/>
-              </a:lnSpc>
-            </a:pPr>
-            <a:r>
-              <a:rPr b="0" lang="en-GB" sz="3000" spc="-1" strike="noStrike">
-                <a:solidFill>
-                  <a:srgbClr val="000000"/>
-                </a:solidFill>
-                <a:latin typeface="Arial"/>
-                <a:ea typeface="DejaVu Sans"/>
-              </a:rPr>
-              <a:t>1- Je veux revoir la paire de mots plus tard</a:t>
-            </a:r>
-            <a:endParaRPr b="0" lang="en-GB" sz="3000" spc="-1" strike="noStrike">
-              <a:latin typeface="Arial"/>
-            </a:endParaRPr>
-          </a:p>
-        </p:txBody>
-      </p:sp>
-      <p:sp>
-        <p:nvSpPr>
-          <p:cNvPr id="189" name="CustomShape 5"/>
-          <p:cNvSpPr/>
-          <p:nvPr/>
-        </p:nvSpPr>
-        <p:spPr>
-          <a:xfrm>
-            <a:off x="837000" y="4023720"/>
-            <a:ext cx="7920360" cy="546120"/>
-          </a:xfrm>
-          <a:prstGeom prst="rect">
-            <a:avLst/>
-          </a:prstGeom>
-          <a:noFill/>
-          <a:ln>
-            <a:noFill/>
-          </a:ln>
-        </p:spPr>
-        <p:style>
-          <a:lnRef idx="0"/>
-          <a:fillRef idx="0"/>
-          <a:effectRef idx="0"/>
-          <a:fontRef idx="minor"/>
-        </p:style>
-        <p:txBody>
-          <a:bodyPr wrap="none" lIns="90000" rIns="90000" tIns="45000" bIns="45000"/>
-          <a:p>
-            <a:pPr algn="ctr">
-              <a:lnSpc>
-                <a:spcPct val="100000"/>
-              </a:lnSpc>
-            </a:pPr>
-            <a:r>
-              <a:rPr b="0" lang="en-GB" sz="3000" spc="-1" strike="noStrike">
-                <a:solidFill>
-                  <a:srgbClr val="000000"/>
-                </a:solidFill>
-                <a:latin typeface="Arial"/>
-                <a:ea typeface="DejaVu Sans"/>
-              </a:rPr>
-              <a:t>2- Je veux me re-tester avec la paire plus tard</a:t>
-            </a:r>
-            <a:endParaRPr b="0" lang="en-GB" sz="3000" spc="-1" strike="noStrike">
-              <a:latin typeface="Arial"/>
-            </a:endParaRPr>
-          </a:p>
-        </p:txBody>
-      </p:sp>
-      <p:sp>
-        <p:nvSpPr>
-          <p:cNvPr id="190" name="CustomShape 6"/>
-          <p:cNvSpPr/>
-          <p:nvPr/>
-        </p:nvSpPr>
-        <p:spPr>
-          <a:xfrm>
-            <a:off x="838440" y="4855680"/>
-            <a:ext cx="8258760" cy="546120"/>
-          </a:xfrm>
-          <a:prstGeom prst="rect">
-            <a:avLst/>
-          </a:prstGeom>
-          <a:noFill/>
-          <a:ln>
-            <a:noFill/>
-          </a:ln>
-        </p:spPr>
-        <p:style>
-          <a:lnRef idx="0"/>
-          <a:fillRef idx="0"/>
-          <a:effectRef idx="0"/>
-          <a:fontRef idx="minor"/>
-        </p:style>
-        <p:txBody>
-          <a:bodyPr wrap="none" lIns="90000" rIns="90000" tIns="45000" bIns="45000"/>
-          <a:p>
-            <a:pPr algn="ctr">
-              <a:lnSpc>
-                <a:spcPct val="100000"/>
-              </a:lnSpc>
-            </a:pPr>
-            <a:r>
-              <a:rPr b="0" lang="en-GB" sz="3000" spc="-1" strike="noStrike">
-                <a:solidFill>
-                  <a:srgbClr val="000000"/>
-                </a:solidFill>
-                <a:latin typeface="Arial"/>
-                <a:ea typeface="DejaVu Sans"/>
-              </a:rPr>
-              <a:t>3- Je ne veux pas revoir la paire ni me re-tester </a:t>
-            </a:r>
-            <a:endParaRPr b="0" lang="en-GB" sz="3000" spc="-1" strike="noStrike">
-              <a:latin typeface="Arial"/>
-            </a:endParaRPr>
-          </a:p>
-        </p:txBody>
-      </p:sp>
-      <p:sp>
-        <p:nvSpPr>
-          <p:cNvPr id="191" name="CustomShape 7"/>
-          <p:cNvSpPr/>
-          <p:nvPr/>
-        </p:nvSpPr>
-        <p:spPr>
-          <a:xfrm>
-            <a:off x="3854880" y="5780880"/>
-            <a:ext cx="4473000" cy="546120"/>
-          </a:xfrm>
-          <a:prstGeom prst="rect">
-            <a:avLst/>
-          </a:prstGeom>
-          <a:noFill/>
-          <a:ln>
-            <a:noFill/>
-          </a:ln>
-        </p:spPr>
-        <p:style>
-          <a:lnRef idx="0"/>
-          <a:fillRef idx="0"/>
-          <a:effectRef idx="0"/>
-          <a:fontRef idx="minor"/>
-        </p:style>
-        <p:txBody>
-          <a:bodyPr wrap="none" lIns="90000" rIns="90000" tIns="45000" bIns="45000"/>
-          <a:p>
-            <a:pPr algn="ctr">
-              <a:lnSpc>
-                <a:spcPct val="100000"/>
-              </a:lnSpc>
-            </a:pPr>
-            <a:r>
-              <a:rPr b="0" lang="en-GB" sz="3000" spc="-1" strike="noStrike">
-                <a:solidFill>
-                  <a:srgbClr val="000000"/>
-                </a:solidFill>
-                <a:latin typeface="Arial"/>
-                <a:ea typeface="DejaVu Sans"/>
-              </a:rPr>
-              <a:t>Tape ton choix (1, 2 ou 3)</a:t>
-            </a:r>
-            <a:endParaRPr b="0" lang="en-GB" sz="3000" spc="-1" strike="noStrike">
-              <a:latin typeface="Arial"/>
-            </a:endParaRPr>
-          </a:p>
-        </p:txBody>
-      </p:sp>
-    </p:spTree>
-  </p:cSld>
-</p:sld>
-</file>
-
 <file path=ppt/slides/slide15.xml><?xml version="1.0" encoding="utf-8"?>
 <p:sld xmlns:a="http://schemas.openxmlformats.org/drawingml/2006/main" xmlns:p="http://schemas.openxmlformats.org/presentationml/2006/main" xmlns:r="http://schemas.openxmlformats.org/officeDocument/2006/relationships" xmlns:p14="http://schemas.microsoft.com/office/powerpoint/2010/main" xmlns:p15="http://schemas.microsoft.com/office/powerpoint/2012/main" xmlns:mc="http://schemas.openxmlformats.org/markup-compatibility/2006">
   <p:cSld>
@@ -6915,14 +6696,14 @@
       </p:grpSpPr>
       <p:sp>
         <p:nvSpPr>
-          <p:cNvPr id="192" name="CustomShape 1"/>
+          <p:cNvPr id="185" name="CustomShape 1"/>
           <p:cNvSpPr/>
           <p:nvPr/>
         </p:nvSpPr>
         <p:spPr>
           <a:xfrm>
-            <a:off x="3535560" y="206640"/>
-            <a:ext cx="4669560" cy="698760"/>
+            <a:off x="3535920" y="206640"/>
+            <a:ext cx="4669200" cy="698400"/>
           </a:xfrm>
           <a:prstGeom prst="rect">
             <a:avLst/>
@@ -6964,14 +6745,14 @@
       </p:sp>
       <p:sp>
         <p:nvSpPr>
-          <p:cNvPr id="193" name="CustomShape 2"/>
+          <p:cNvPr id="186" name="CustomShape 2"/>
           <p:cNvSpPr/>
           <p:nvPr/>
         </p:nvSpPr>
         <p:spPr>
           <a:xfrm>
-            <a:off x="5685840" y="1280880"/>
-            <a:ext cx="402480" cy="546120"/>
+            <a:off x="3948480" y="1280880"/>
+            <a:ext cx="1153440" cy="545760"/>
           </a:xfrm>
           <a:prstGeom prst="rect">
             <a:avLst/>
@@ -7003,7 +6784,7 @@
                 <a:latin typeface="Arial"/>
                 <a:ea typeface="DejaVu Sans"/>
               </a:rPr>
-              <a:t>=</a:t>
+              <a:t>Vonat</a:t>
             </a:r>
             <a:endParaRPr b="0" lang="en-GB" sz="3000" spc="-1" strike="noStrike">
               <a:latin typeface="Arial"/>
@@ -7013,14 +6794,14 @@
       </p:sp>
       <p:sp>
         <p:nvSpPr>
-          <p:cNvPr id="194" name="CustomShape 3"/>
+          <p:cNvPr id="187" name="CustomShape 3"/>
           <p:cNvSpPr/>
           <p:nvPr/>
         </p:nvSpPr>
         <p:spPr>
           <a:xfrm>
-            <a:off x="3446280" y="2112840"/>
-            <a:ext cx="5033880" cy="698760"/>
+            <a:off x="6606360" y="1280880"/>
+            <a:ext cx="1033200" cy="545760"/>
           </a:xfrm>
           <a:prstGeom prst="rect">
             <a:avLst/>
@@ -7045,31 +6826,31 @@
               </a:lnSpc>
             </a:pPr>
             <a:r>
-              <a:rPr b="0" lang="en-GB" sz="4000" spc="-1" strike="noStrike">
+              <a:rPr b="0" lang="en-GB" sz="3000" spc="-1" strike="noStrike">
                 <a:solidFill>
                   <a:srgbClr val="000000"/>
                 </a:solidFill>
                 <a:latin typeface="Arial"/>
                 <a:ea typeface="DejaVu Sans"/>
               </a:rPr>
-              <a:t>Que souhaiterais-tu ?</a:t>
-            </a:r>
-            <a:endParaRPr b="0" lang="en-GB" sz="4000" spc="-1" strike="noStrike">
-              <a:latin typeface="Arial"/>
-            </a:endParaRPr>
-          </a:p>
-        </p:txBody>
-      </p:sp>
-      <p:sp>
-        <p:nvSpPr>
-          <p:cNvPr id="195" name="CustomShape 4"/>
+              <a:t>Train</a:t>
+            </a:r>
+            <a:endParaRPr b="0" lang="en-GB" sz="3000" spc="-1" strike="noStrike">
+              <a:latin typeface="Arial"/>
+            </a:endParaRPr>
+          </a:p>
+        </p:txBody>
+      </p:sp>
+      <p:sp>
+        <p:nvSpPr>
+          <p:cNvPr id="188" name="CustomShape 4"/>
           <p:cNvSpPr/>
           <p:nvPr/>
         </p:nvSpPr>
         <p:spPr>
           <a:xfrm>
-            <a:off x="833040" y="3191760"/>
-            <a:ext cx="7371720" cy="546120"/>
+            <a:off x="5686200" y="1280880"/>
+            <a:ext cx="402120" cy="545760"/>
           </a:xfrm>
           <a:prstGeom prst="rect">
             <a:avLst/>
@@ -7101,7 +6882,7 @@
                 <a:latin typeface="Arial"/>
                 <a:ea typeface="DejaVu Sans"/>
               </a:rPr>
-              <a:t>1- Je veux revoir la paire de mots plus tard</a:t>
+              <a:t>=</a:t>
             </a:r>
             <a:endParaRPr b="0" lang="en-GB" sz="3000" spc="-1" strike="noStrike">
               <a:latin typeface="Arial"/>
@@ -7111,14 +6892,14 @@
       </p:sp>
       <p:sp>
         <p:nvSpPr>
-          <p:cNvPr id="196" name="CustomShape 5"/>
+          <p:cNvPr id="189" name="CustomShape 5"/>
           <p:cNvSpPr/>
           <p:nvPr/>
         </p:nvSpPr>
         <p:spPr>
           <a:xfrm>
-            <a:off x="837000" y="4023720"/>
-            <a:ext cx="7920360" cy="546120"/>
+            <a:off x="3446640" y="2112840"/>
+            <a:ext cx="5033520" cy="698400"/>
           </a:xfrm>
           <a:prstGeom prst="rect">
             <a:avLst/>
@@ -7143,31 +6924,31 @@
               </a:lnSpc>
             </a:pPr>
             <a:r>
-              <a:rPr b="0" lang="en-GB" sz="3000" spc="-1" strike="noStrike">
+              <a:rPr b="0" lang="en-GB" sz="4000" spc="-1" strike="noStrike">
                 <a:solidFill>
                   <a:srgbClr val="000000"/>
                 </a:solidFill>
                 <a:latin typeface="Arial"/>
                 <a:ea typeface="DejaVu Sans"/>
               </a:rPr>
-              <a:t>2- Je veux me re-tester avec la paire plus tard</a:t>
-            </a:r>
-            <a:endParaRPr b="0" lang="en-GB" sz="3000" spc="-1" strike="noStrike">
-              <a:latin typeface="Arial"/>
-            </a:endParaRPr>
-          </a:p>
-        </p:txBody>
-      </p:sp>
-      <p:sp>
-        <p:nvSpPr>
-          <p:cNvPr id="197" name="CustomShape 6"/>
+              <a:t>Que souhaiterais-tu ?</a:t>
+            </a:r>
+            <a:endParaRPr b="0" lang="en-GB" sz="4000" spc="-1" strike="noStrike">
+              <a:latin typeface="Arial"/>
+            </a:endParaRPr>
+          </a:p>
+        </p:txBody>
+      </p:sp>
+      <p:sp>
+        <p:nvSpPr>
+          <p:cNvPr id="190" name="CustomShape 6"/>
           <p:cNvSpPr/>
           <p:nvPr/>
         </p:nvSpPr>
         <p:spPr>
           <a:xfrm>
-            <a:off x="838440" y="4855680"/>
-            <a:ext cx="8258760" cy="546120"/>
+            <a:off x="833400" y="3191760"/>
+            <a:ext cx="7371360" cy="545760"/>
           </a:xfrm>
           <a:prstGeom prst="rect">
             <a:avLst/>
@@ -7199,7 +6980,7 @@
                 <a:latin typeface="Arial"/>
                 <a:ea typeface="DejaVu Sans"/>
               </a:rPr>
-              <a:t>3- Je ne veux pas revoir la paire ni me re-tester </a:t>
+              <a:t>1- Je veux revoir la paire de mots plus tard</a:t>
             </a:r>
             <a:endParaRPr b="0" lang="en-GB" sz="3000" spc="-1" strike="noStrike">
               <a:latin typeface="Arial"/>
@@ -7209,14 +6990,14 @@
       </p:sp>
       <p:sp>
         <p:nvSpPr>
-          <p:cNvPr id="198" name="CustomShape 7"/>
+          <p:cNvPr id="191" name="CustomShape 7"/>
           <p:cNvSpPr/>
           <p:nvPr/>
         </p:nvSpPr>
         <p:spPr>
           <a:xfrm>
-            <a:off x="3854880" y="5780880"/>
-            <a:ext cx="4473000" cy="546120"/>
+            <a:off x="837360" y="4023720"/>
+            <a:ext cx="7920000" cy="545760"/>
           </a:xfrm>
           <a:prstGeom prst="rect">
             <a:avLst/>
@@ -7248,6 +7029,104 @@
                 <a:latin typeface="Arial"/>
                 <a:ea typeface="DejaVu Sans"/>
               </a:rPr>
+              <a:t>2- Je veux me re-tester avec la paire plus tard</a:t>
+            </a:r>
+            <a:endParaRPr b="0" lang="en-GB" sz="3000" spc="-1" strike="noStrike">
+              <a:latin typeface="Arial"/>
+            </a:endParaRPr>
+          </a:p>
+        </p:txBody>
+      </p:sp>
+      <p:sp>
+        <p:nvSpPr>
+          <p:cNvPr id="192" name="CustomShape 8"/>
+          <p:cNvSpPr/>
+          <p:nvPr/>
+        </p:nvSpPr>
+        <p:spPr>
+          <a:xfrm>
+            <a:off x="838800" y="4855680"/>
+            <a:ext cx="8258400" cy="545760"/>
+          </a:xfrm>
+          <a:prstGeom prst="rect">
+            <a:avLst/>
+          </a:prstGeom>
+          <a:noFill/>
+          <a:ln>
+            <a:noFill/>
+          </a:ln>
+        </p:spPr>
+        <p:style>
+          <a:lnRef idx="0"/>
+          <a:fillRef idx="0"/>
+          <a:effectRef idx="0"/>
+          <a:fontRef idx="minor"/>
+        </p:style>
+        <p:txBody>
+          <a:bodyPr wrap="none" lIns="90000" rIns="90000" tIns="45000" bIns="45000"/>
+          <a:p>
+            <a:pPr algn="ctr">
+              <a:lnSpc>
+                <a:spcPct val="100000"/>
+              </a:lnSpc>
+            </a:pPr>
+            <a:r>
+              <a:rPr b="0" lang="en-GB" sz="3000" spc="-1" strike="noStrike">
+                <a:solidFill>
+                  <a:srgbClr val="000000"/>
+                </a:solidFill>
+                <a:latin typeface="Arial"/>
+                <a:ea typeface="DejaVu Sans"/>
+              </a:rPr>
+              <a:t>3- Je ne veux pas revoir la paire ni me re-tester </a:t>
+            </a:r>
+            <a:endParaRPr b="0" lang="en-GB" sz="3000" spc="-1" strike="noStrike">
+              <a:latin typeface="Arial"/>
+            </a:endParaRPr>
+          </a:p>
+        </p:txBody>
+      </p:sp>
+      <p:sp>
+        <p:nvSpPr>
+          <p:cNvPr id="193" name="CustomShape 9"/>
+          <p:cNvSpPr/>
+          <p:nvPr/>
+        </p:nvSpPr>
+        <p:spPr>
+          <a:xfrm>
+            <a:off x="3855240" y="5780880"/>
+            <a:ext cx="4472640" cy="545760"/>
+          </a:xfrm>
+          <a:prstGeom prst="rect">
+            <a:avLst/>
+          </a:prstGeom>
+          <a:noFill/>
+          <a:ln>
+            <a:noFill/>
+          </a:ln>
+        </p:spPr>
+        <p:style>
+          <a:lnRef idx="0"/>
+          <a:fillRef idx="0"/>
+          <a:effectRef idx="0"/>
+          <a:fontRef idx="minor"/>
+        </p:style>
+        <p:txBody>
+          <a:bodyPr wrap="none" lIns="90000" rIns="90000" tIns="45000" bIns="45000"/>
+          <a:p>
+            <a:pPr algn="ctr">
+              <a:lnSpc>
+                <a:spcPct val="100000"/>
+              </a:lnSpc>
+            </a:pPr>
+            <a:r>
+              <a:rPr b="0" lang="en-GB" sz="3000" spc="-1" strike="noStrike">
+                <a:solidFill>
+                  <a:srgbClr val="000000"/>
+                </a:solidFill>
+                <a:latin typeface="Arial"/>
+                <a:ea typeface="DejaVu Sans"/>
+              </a:rPr>
               <a:t>Tape ton choix (1, 2 ou 3)</a:t>
             </a:r>
             <a:endParaRPr b="0" lang="en-GB" sz="3000" spc="-1" strike="noStrike">
@@ -7258,6 +7137,33 @@
       </p:sp>
     </p:spTree>
   </p:cSld>
+  <p:timing>
+    <p:tnLst>
+      <p:par>
+        <p:cTn id="17" dur="indefinite" restart="never" nodeType="tmRoot">
+          <p:childTnLst>
+            <p:seq>
+              <p:cTn id="18" dur="indefinite" nodeType="mainSeq"/>
+              <p:prevCondLst>
+                <p:cond delay="0" evt="onPrev">
+                  <p:tgtEl>
+                    <p:sldTgt/>
+                  </p:tgtEl>
+                </p:cond>
+              </p:prevCondLst>
+              <p:nextCondLst>
+                <p:cond delay="0" evt="onNext">
+                  <p:tgtEl>
+                    <p:sldTgt/>
+                  </p:tgtEl>
+                </p:cond>
+              </p:nextCondLst>
+            </p:seq>
+          </p:childTnLst>
+        </p:cTn>
+      </p:par>
+    </p:tnLst>
+  </p:timing>
 </p:sld>
 </file>
 
@@ -7280,14 +7186,14 @@
       </p:grpSpPr>
       <p:sp>
         <p:nvSpPr>
-          <p:cNvPr id="199" name="CustomShape 1"/>
+          <p:cNvPr id="194" name="CustomShape 1"/>
           <p:cNvSpPr/>
           <p:nvPr/>
         </p:nvSpPr>
         <p:spPr>
           <a:xfrm>
-            <a:off x="838080" y="365040"/>
-            <a:ext cx="10514160" cy="1324080"/>
+            <a:off x="3535560" y="206640"/>
+            <a:ext cx="4669200" cy="698400"/>
           </a:xfrm>
           <a:prstGeom prst="rect">
             <a:avLst/>
@@ -7303,17 +7209,40 @@
           <a:effectRef idx="0"/>
           <a:fontRef idx="minor"/>
         </p:style>
-      </p:sp>
-      <p:sp>
-        <p:nvSpPr>
-          <p:cNvPr id="200" name="CustomShape 2"/>
+        <p:txBody>
+          <a:bodyPr wrap="none" lIns="90000" rIns="90000" tIns="45000" bIns="45000"/>
+          <a:p>
+            <a:pPr algn="ctr">
+              <a:lnSpc>
+                <a:spcPct val="100000"/>
+              </a:lnSpc>
+            </a:pPr>
+            <a:r>
+              <a:rPr b="0" lang="en-GB" sz="4000" spc="-1" strike="noStrike">
+                <a:solidFill>
+                  <a:srgbClr val="000000"/>
+                </a:solidFill>
+                <a:latin typeface="Arial"/>
+                <a:ea typeface="DejaVu Sans"/>
+              </a:rPr>
+              <a:t>Bravo ! Tu as réussi</a:t>
+            </a:r>
+            <a:endParaRPr b="0" lang="en-GB" sz="4000" spc="-1" strike="noStrike">
+              <a:latin typeface="Arial"/>
+            </a:endParaRPr>
+          </a:p>
+        </p:txBody>
+      </p:sp>
+      <p:sp>
+        <p:nvSpPr>
+          <p:cNvPr id="195" name="CustomShape 2"/>
           <p:cNvSpPr/>
           <p:nvPr/>
         </p:nvSpPr>
         <p:spPr>
           <a:xfrm>
-            <a:off x="838080" y="1825560"/>
-            <a:ext cx="3384720" cy="2073960"/>
+            <a:off x="5685840" y="1280880"/>
+            <a:ext cx="402120" cy="545760"/>
           </a:xfrm>
           <a:prstGeom prst="rect">
             <a:avLst/>
@@ -7329,17 +7258,40 @@
           <a:effectRef idx="0"/>
           <a:fontRef idx="minor"/>
         </p:style>
-      </p:sp>
-      <p:sp>
-        <p:nvSpPr>
-          <p:cNvPr id="201" name="CustomShape 3"/>
+        <p:txBody>
+          <a:bodyPr wrap="none" lIns="90000" rIns="90000" tIns="45000" bIns="45000"/>
+          <a:p>
+            <a:pPr algn="ctr">
+              <a:lnSpc>
+                <a:spcPct val="100000"/>
+              </a:lnSpc>
+            </a:pPr>
+            <a:r>
+              <a:rPr b="0" lang="en-GB" sz="3000" spc="-1" strike="noStrike">
+                <a:solidFill>
+                  <a:srgbClr val="000000"/>
+                </a:solidFill>
+                <a:latin typeface="Arial"/>
+                <a:ea typeface="DejaVu Sans"/>
+              </a:rPr>
+              <a:t>=</a:t>
+            </a:r>
+            <a:endParaRPr b="0" lang="en-GB" sz="3000" spc="-1" strike="noStrike">
+              <a:latin typeface="Arial"/>
+            </a:endParaRPr>
+          </a:p>
+        </p:txBody>
+      </p:sp>
+      <p:sp>
+        <p:nvSpPr>
+          <p:cNvPr id="196" name="CustomShape 3"/>
           <p:cNvSpPr/>
           <p:nvPr/>
         </p:nvSpPr>
         <p:spPr>
           <a:xfrm>
-            <a:off x="4393440" y="1825560"/>
-            <a:ext cx="3384720" cy="2073960"/>
+            <a:off x="3446280" y="2112840"/>
+            <a:ext cx="5033520" cy="698400"/>
           </a:xfrm>
           <a:prstGeom prst="rect">
             <a:avLst/>
@@ -7355,17 +7307,40 @@
           <a:effectRef idx="0"/>
           <a:fontRef idx="minor"/>
         </p:style>
-      </p:sp>
-      <p:sp>
-        <p:nvSpPr>
-          <p:cNvPr id="202" name="CustomShape 4"/>
+        <p:txBody>
+          <a:bodyPr wrap="none" lIns="90000" rIns="90000" tIns="45000" bIns="45000"/>
+          <a:p>
+            <a:pPr algn="ctr">
+              <a:lnSpc>
+                <a:spcPct val="100000"/>
+              </a:lnSpc>
+            </a:pPr>
+            <a:r>
+              <a:rPr b="0" lang="en-GB" sz="4000" spc="-1" strike="noStrike">
+                <a:solidFill>
+                  <a:srgbClr val="000000"/>
+                </a:solidFill>
+                <a:latin typeface="Arial"/>
+                <a:ea typeface="DejaVu Sans"/>
+              </a:rPr>
+              <a:t>Que souhaiterais-tu ?</a:t>
+            </a:r>
+            <a:endParaRPr b="0" lang="en-GB" sz="4000" spc="-1" strike="noStrike">
+              <a:latin typeface="Arial"/>
+            </a:endParaRPr>
+          </a:p>
+        </p:txBody>
+      </p:sp>
+      <p:sp>
+        <p:nvSpPr>
+          <p:cNvPr id="197" name="CustomShape 4"/>
           <p:cNvSpPr/>
           <p:nvPr/>
         </p:nvSpPr>
         <p:spPr>
           <a:xfrm>
-            <a:off x="7949160" y="1825560"/>
-            <a:ext cx="3384720" cy="2073960"/>
+            <a:off x="833040" y="3191760"/>
+            <a:ext cx="7371360" cy="545760"/>
           </a:xfrm>
           <a:prstGeom prst="rect">
             <a:avLst/>
@@ -7381,17 +7356,40 @@
           <a:effectRef idx="0"/>
           <a:fontRef idx="minor"/>
         </p:style>
-      </p:sp>
-      <p:sp>
-        <p:nvSpPr>
-          <p:cNvPr id="203" name="CustomShape 5"/>
+        <p:txBody>
+          <a:bodyPr wrap="none" lIns="90000" rIns="90000" tIns="45000" bIns="45000"/>
+          <a:p>
+            <a:pPr algn="ctr">
+              <a:lnSpc>
+                <a:spcPct val="100000"/>
+              </a:lnSpc>
+            </a:pPr>
+            <a:r>
+              <a:rPr b="0" lang="en-GB" sz="3000" spc="-1" strike="noStrike">
+                <a:solidFill>
+                  <a:srgbClr val="000000"/>
+                </a:solidFill>
+                <a:latin typeface="Arial"/>
+                <a:ea typeface="DejaVu Sans"/>
+              </a:rPr>
+              <a:t>1- Je veux revoir la paire de mots plus tard</a:t>
+            </a:r>
+            <a:endParaRPr b="0" lang="en-GB" sz="3000" spc="-1" strike="noStrike">
+              <a:latin typeface="Arial"/>
+            </a:endParaRPr>
+          </a:p>
+        </p:txBody>
+      </p:sp>
+      <p:sp>
+        <p:nvSpPr>
+          <p:cNvPr id="198" name="CustomShape 5"/>
           <p:cNvSpPr/>
           <p:nvPr/>
         </p:nvSpPr>
         <p:spPr>
           <a:xfrm>
-            <a:off x="838080" y="4098240"/>
-            <a:ext cx="3384720" cy="2073960"/>
+            <a:off x="837000" y="4023720"/>
+            <a:ext cx="7920000" cy="545760"/>
           </a:xfrm>
           <a:prstGeom prst="rect">
             <a:avLst/>
@@ -7407,17 +7405,40 @@
           <a:effectRef idx="0"/>
           <a:fontRef idx="minor"/>
         </p:style>
-      </p:sp>
-      <p:sp>
-        <p:nvSpPr>
-          <p:cNvPr id="204" name="CustomShape 6"/>
+        <p:txBody>
+          <a:bodyPr wrap="none" lIns="90000" rIns="90000" tIns="45000" bIns="45000"/>
+          <a:p>
+            <a:pPr algn="ctr">
+              <a:lnSpc>
+                <a:spcPct val="100000"/>
+              </a:lnSpc>
+            </a:pPr>
+            <a:r>
+              <a:rPr b="0" lang="en-GB" sz="3000" spc="-1" strike="noStrike">
+                <a:solidFill>
+                  <a:srgbClr val="000000"/>
+                </a:solidFill>
+                <a:latin typeface="Arial"/>
+                <a:ea typeface="DejaVu Sans"/>
+              </a:rPr>
+              <a:t>2- Je veux me re-tester avec la paire plus tard</a:t>
+            </a:r>
+            <a:endParaRPr b="0" lang="en-GB" sz="3000" spc="-1" strike="noStrike">
+              <a:latin typeface="Arial"/>
+            </a:endParaRPr>
+          </a:p>
+        </p:txBody>
+      </p:sp>
+      <p:sp>
+        <p:nvSpPr>
+          <p:cNvPr id="199" name="CustomShape 6"/>
           <p:cNvSpPr/>
           <p:nvPr/>
         </p:nvSpPr>
         <p:spPr>
           <a:xfrm>
-            <a:off x="4393440" y="4098240"/>
-            <a:ext cx="3384720" cy="2073960"/>
+            <a:off x="838440" y="4855680"/>
+            <a:ext cx="8258400" cy="545760"/>
           </a:xfrm>
           <a:prstGeom prst="rect">
             <a:avLst/>
@@ -7433,17 +7454,40 @@
           <a:effectRef idx="0"/>
           <a:fontRef idx="minor"/>
         </p:style>
-      </p:sp>
-      <p:sp>
-        <p:nvSpPr>
-          <p:cNvPr id="205" name="CustomShape 7"/>
+        <p:txBody>
+          <a:bodyPr wrap="none" lIns="90000" rIns="90000" tIns="45000" bIns="45000"/>
+          <a:p>
+            <a:pPr algn="ctr">
+              <a:lnSpc>
+                <a:spcPct val="100000"/>
+              </a:lnSpc>
+            </a:pPr>
+            <a:r>
+              <a:rPr b="0" lang="en-GB" sz="3000" spc="-1" strike="noStrike">
+                <a:solidFill>
+                  <a:srgbClr val="000000"/>
+                </a:solidFill>
+                <a:latin typeface="Arial"/>
+                <a:ea typeface="DejaVu Sans"/>
+              </a:rPr>
+              <a:t>3- Je ne veux pas revoir la paire ni me re-tester </a:t>
+            </a:r>
+            <a:endParaRPr b="0" lang="en-GB" sz="3000" spc="-1" strike="noStrike">
+              <a:latin typeface="Arial"/>
+            </a:endParaRPr>
+          </a:p>
+        </p:txBody>
+      </p:sp>
+      <p:sp>
+        <p:nvSpPr>
+          <p:cNvPr id="200" name="CustomShape 7"/>
           <p:cNvSpPr/>
           <p:nvPr/>
         </p:nvSpPr>
         <p:spPr>
           <a:xfrm>
-            <a:off x="7949160" y="4098240"/>
-            <a:ext cx="3384720" cy="2073960"/>
+            <a:off x="3854880" y="5780880"/>
+            <a:ext cx="4472640" cy="545760"/>
           </a:xfrm>
           <a:prstGeom prst="rect">
             <a:avLst/>
@@ -7459,10 +7503,602 @@
           <a:effectRef idx="0"/>
           <a:fontRef idx="minor"/>
         </p:style>
+        <p:txBody>
+          <a:bodyPr wrap="none" lIns="90000" rIns="90000" tIns="45000" bIns="45000"/>
+          <a:p>
+            <a:pPr algn="ctr">
+              <a:lnSpc>
+                <a:spcPct val="100000"/>
+              </a:lnSpc>
+            </a:pPr>
+            <a:r>
+              <a:rPr b="0" lang="en-GB" sz="3000" spc="-1" strike="noStrike">
+                <a:solidFill>
+                  <a:srgbClr val="000000"/>
+                </a:solidFill>
+                <a:latin typeface="Arial"/>
+                <a:ea typeface="DejaVu Sans"/>
+              </a:rPr>
+              <a:t>Tape ton choix (1, 2 ou 3)</a:t>
+            </a:r>
+            <a:endParaRPr b="0" lang="en-GB" sz="3000" spc="-1" strike="noStrike">
+              <a:latin typeface="Arial"/>
+            </a:endParaRPr>
+          </a:p>
+        </p:txBody>
+      </p:sp>
+    </p:spTree>
+  </p:cSld>
+</p:sld>
+</file>
+
+<file path=ppt/slides/slide17.xml><?xml version="1.0" encoding="utf-8"?>
+<p:sld xmlns:a="http://schemas.openxmlformats.org/drawingml/2006/main" xmlns:p="http://schemas.openxmlformats.org/presentationml/2006/main" xmlns:r="http://schemas.openxmlformats.org/officeDocument/2006/relationships" xmlns:p14="http://schemas.microsoft.com/office/powerpoint/2010/main" xmlns:p15="http://schemas.microsoft.com/office/powerpoint/2012/main" xmlns:mc="http://schemas.openxmlformats.org/markup-compatibility/2006">
+  <p:cSld>
+    <p:spTree>
+      <p:nvGrpSpPr>
+        <p:cNvPr id="1" name=""/>
+        <p:cNvGrpSpPr/>
+        <p:nvPr/>
+      </p:nvGrpSpPr>
+      <p:grpSpPr>
+        <a:xfrm>
+          <a:off x="0" y="0"/>
+          <a:ext cx="0" cy="0"/>
+          <a:chOff x="0" y="0"/>
+          <a:chExt cx="0" cy="0"/>
+        </a:xfrm>
+      </p:grpSpPr>
+      <p:sp>
+        <p:nvSpPr>
+          <p:cNvPr id="201" name="CustomShape 1"/>
+          <p:cNvSpPr/>
+          <p:nvPr/>
+        </p:nvSpPr>
+        <p:spPr>
+          <a:xfrm>
+            <a:off x="3535560" y="206640"/>
+            <a:ext cx="4669200" cy="698400"/>
+          </a:xfrm>
+          <a:prstGeom prst="rect">
+            <a:avLst/>
+          </a:prstGeom>
+          <a:noFill/>
+          <a:ln>
+            <a:noFill/>
+          </a:ln>
+        </p:spPr>
+        <p:style>
+          <a:lnRef idx="0"/>
+          <a:fillRef idx="0"/>
+          <a:effectRef idx="0"/>
+          <a:fontRef idx="minor"/>
+        </p:style>
+        <p:txBody>
+          <a:bodyPr wrap="none" lIns="90000" rIns="90000" tIns="45000" bIns="45000"/>
+          <a:p>
+            <a:pPr algn="ctr">
+              <a:lnSpc>
+                <a:spcPct val="100000"/>
+              </a:lnSpc>
+            </a:pPr>
+            <a:r>
+              <a:rPr b="0" lang="en-GB" sz="4000" spc="-1" strike="noStrike">
+                <a:solidFill>
+                  <a:srgbClr val="000000"/>
+                </a:solidFill>
+                <a:latin typeface="Arial"/>
+                <a:ea typeface="DejaVu Sans"/>
+              </a:rPr>
+              <a:t>Bravo ! Tu as réussi</a:t>
+            </a:r>
+            <a:endParaRPr b="0" lang="en-GB" sz="4000" spc="-1" strike="noStrike">
+              <a:latin typeface="Arial"/>
+            </a:endParaRPr>
+          </a:p>
+        </p:txBody>
+      </p:sp>
+      <p:sp>
+        <p:nvSpPr>
+          <p:cNvPr id="202" name="CustomShape 2"/>
+          <p:cNvSpPr/>
+          <p:nvPr/>
+        </p:nvSpPr>
+        <p:spPr>
+          <a:xfrm>
+            <a:off x="5685840" y="1280880"/>
+            <a:ext cx="402120" cy="545760"/>
+          </a:xfrm>
+          <a:prstGeom prst="rect">
+            <a:avLst/>
+          </a:prstGeom>
+          <a:noFill/>
+          <a:ln>
+            <a:noFill/>
+          </a:ln>
+        </p:spPr>
+        <p:style>
+          <a:lnRef idx="0"/>
+          <a:fillRef idx="0"/>
+          <a:effectRef idx="0"/>
+          <a:fontRef idx="minor"/>
+        </p:style>
+        <p:txBody>
+          <a:bodyPr wrap="none" lIns="90000" rIns="90000" tIns="45000" bIns="45000"/>
+          <a:p>
+            <a:pPr algn="ctr">
+              <a:lnSpc>
+                <a:spcPct val="100000"/>
+              </a:lnSpc>
+            </a:pPr>
+            <a:r>
+              <a:rPr b="0" lang="en-GB" sz="3000" spc="-1" strike="noStrike">
+                <a:solidFill>
+                  <a:srgbClr val="000000"/>
+                </a:solidFill>
+                <a:latin typeface="Arial"/>
+                <a:ea typeface="DejaVu Sans"/>
+              </a:rPr>
+              <a:t>=</a:t>
+            </a:r>
+            <a:endParaRPr b="0" lang="en-GB" sz="3000" spc="-1" strike="noStrike">
+              <a:latin typeface="Arial"/>
+            </a:endParaRPr>
+          </a:p>
+        </p:txBody>
+      </p:sp>
+      <p:sp>
+        <p:nvSpPr>
+          <p:cNvPr id="203" name="CustomShape 3"/>
+          <p:cNvSpPr/>
+          <p:nvPr/>
+        </p:nvSpPr>
+        <p:spPr>
+          <a:xfrm>
+            <a:off x="3446280" y="2112840"/>
+            <a:ext cx="5033520" cy="698400"/>
+          </a:xfrm>
+          <a:prstGeom prst="rect">
+            <a:avLst/>
+          </a:prstGeom>
+          <a:noFill/>
+          <a:ln>
+            <a:noFill/>
+          </a:ln>
+        </p:spPr>
+        <p:style>
+          <a:lnRef idx="0"/>
+          <a:fillRef idx="0"/>
+          <a:effectRef idx="0"/>
+          <a:fontRef idx="minor"/>
+        </p:style>
+        <p:txBody>
+          <a:bodyPr wrap="none" lIns="90000" rIns="90000" tIns="45000" bIns="45000"/>
+          <a:p>
+            <a:pPr algn="ctr">
+              <a:lnSpc>
+                <a:spcPct val="100000"/>
+              </a:lnSpc>
+            </a:pPr>
+            <a:r>
+              <a:rPr b="0" lang="en-GB" sz="4000" spc="-1" strike="noStrike">
+                <a:solidFill>
+                  <a:srgbClr val="000000"/>
+                </a:solidFill>
+                <a:latin typeface="Arial"/>
+                <a:ea typeface="DejaVu Sans"/>
+              </a:rPr>
+              <a:t>Que souhaiterais-tu ?</a:t>
+            </a:r>
+            <a:endParaRPr b="0" lang="en-GB" sz="4000" spc="-1" strike="noStrike">
+              <a:latin typeface="Arial"/>
+            </a:endParaRPr>
+          </a:p>
+        </p:txBody>
+      </p:sp>
+      <p:sp>
+        <p:nvSpPr>
+          <p:cNvPr id="204" name="CustomShape 4"/>
+          <p:cNvSpPr/>
+          <p:nvPr/>
+        </p:nvSpPr>
+        <p:spPr>
+          <a:xfrm>
+            <a:off x="833040" y="3191760"/>
+            <a:ext cx="7371360" cy="545760"/>
+          </a:xfrm>
+          <a:prstGeom prst="rect">
+            <a:avLst/>
+          </a:prstGeom>
+          <a:noFill/>
+          <a:ln>
+            <a:noFill/>
+          </a:ln>
+        </p:spPr>
+        <p:style>
+          <a:lnRef idx="0"/>
+          <a:fillRef idx="0"/>
+          <a:effectRef idx="0"/>
+          <a:fontRef idx="minor"/>
+        </p:style>
+        <p:txBody>
+          <a:bodyPr wrap="none" lIns="90000" rIns="90000" tIns="45000" bIns="45000"/>
+          <a:p>
+            <a:pPr algn="ctr">
+              <a:lnSpc>
+                <a:spcPct val="100000"/>
+              </a:lnSpc>
+            </a:pPr>
+            <a:r>
+              <a:rPr b="0" lang="en-GB" sz="3000" spc="-1" strike="noStrike">
+                <a:solidFill>
+                  <a:srgbClr val="000000"/>
+                </a:solidFill>
+                <a:latin typeface="Arial"/>
+                <a:ea typeface="DejaVu Sans"/>
+              </a:rPr>
+              <a:t>1- Je veux revoir la paire de mots plus tard</a:t>
+            </a:r>
+            <a:endParaRPr b="0" lang="en-GB" sz="3000" spc="-1" strike="noStrike">
+              <a:latin typeface="Arial"/>
+            </a:endParaRPr>
+          </a:p>
+        </p:txBody>
+      </p:sp>
+      <p:sp>
+        <p:nvSpPr>
+          <p:cNvPr id="205" name="CustomShape 5"/>
+          <p:cNvSpPr/>
+          <p:nvPr/>
+        </p:nvSpPr>
+        <p:spPr>
+          <a:xfrm>
+            <a:off x="837000" y="4023720"/>
+            <a:ext cx="7920000" cy="545760"/>
+          </a:xfrm>
+          <a:prstGeom prst="rect">
+            <a:avLst/>
+          </a:prstGeom>
+          <a:noFill/>
+          <a:ln>
+            <a:noFill/>
+          </a:ln>
+        </p:spPr>
+        <p:style>
+          <a:lnRef idx="0"/>
+          <a:fillRef idx="0"/>
+          <a:effectRef idx="0"/>
+          <a:fontRef idx="minor"/>
+        </p:style>
+        <p:txBody>
+          <a:bodyPr wrap="none" lIns="90000" rIns="90000" tIns="45000" bIns="45000"/>
+          <a:p>
+            <a:pPr algn="ctr">
+              <a:lnSpc>
+                <a:spcPct val="100000"/>
+              </a:lnSpc>
+            </a:pPr>
+            <a:r>
+              <a:rPr b="0" lang="en-GB" sz="3000" spc="-1" strike="noStrike">
+                <a:solidFill>
+                  <a:srgbClr val="000000"/>
+                </a:solidFill>
+                <a:latin typeface="Arial"/>
+                <a:ea typeface="DejaVu Sans"/>
+              </a:rPr>
+              <a:t>2- Je veux me re-tester avec la paire plus tard</a:t>
+            </a:r>
+            <a:endParaRPr b="0" lang="en-GB" sz="3000" spc="-1" strike="noStrike">
+              <a:latin typeface="Arial"/>
+            </a:endParaRPr>
+          </a:p>
+        </p:txBody>
+      </p:sp>
+      <p:sp>
+        <p:nvSpPr>
+          <p:cNvPr id="206" name="CustomShape 6"/>
+          <p:cNvSpPr/>
+          <p:nvPr/>
+        </p:nvSpPr>
+        <p:spPr>
+          <a:xfrm>
+            <a:off x="838440" y="4855680"/>
+            <a:ext cx="8258400" cy="545760"/>
+          </a:xfrm>
+          <a:prstGeom prst="rect">
+            <a:avLst/>
+          </a:prstGeom>
+          <a:noFill/>
+          <a:ln>
+            <a:noFill/>
+          </a:ln>
+        </p:spPr>
+        <p:style>
+          <a:lnRef idx="0"/>
+          <a:fillRef idx="0"/>
+          <a:effectRef idx="0"/>
+          <a:fontRef idx="minor"/>
+        </p:style>
+        <p:txBody>
+          <a:bodyPr wrap="none" lIns="90000" rIns="90000" tIns="45000" bIns="45000"/>
+          <a:p>
+            <a:pPr algn="ctr">
+              <a:lnSpc>
+                <a:spcPct val="100000"/>
+              </a:lnSpc>
+            </a:pPr>
+            <a:r>
+              <a:rPr b="0" lang="en-GB" sz="3000" spc="-1" strike="noStrike">
+                <a:solidFill>
+                  <a:srgbClr val="000000"/>
+                </a:solidFill>
+                <a:latin typeface="Arial"/>
+                <a:ea typeface="DejaVu Sans"/>
+              </a:rPr>
+              <a:t>3- Je ne veux pas revoir la paire ni me re-tester </a:t>
+            </a:r>
+            <a:endParaRPr b="0" lang="en-GB" sz="3000" spc="-1" strike="noStrike">
+              <a:latin typeface="Arial"/>
+            </a:endParaRPr>
+          </a:p>
+        </p:txBody>
+      </p:sp>
+      <p:sp>
+        <p:nvSpPr>
+          <p:cNvPr id="207" name="CustomShape 7"/>
+          <p:cNvSpPr/>
+          <p:nvPr/>
+        </p:nvSpPr>
+        <p:spPr>
+          <a:xfrm>
+            <a:off x="3854880" y="5780880"/>
+            <a:ext cx="4472640" cy="545760"/>
+          </a:xfrm>
+          <a:prstGeom prst="rect">
+            <a:avLst/>
+          </a:prstGeom>
+          <a:noFill/>
+          <a:ln>
+            <a:noFill/>
+          </a:ln>
+        </p:spPr>
+        <p:style>
+          <a:lnRef idx="0"/>
+          <a:fillRef idx="0"/>
+          <a:effectRef idx="0"/>
+          <a:fontRef idx="minor"/>
+        </p:style>
+        <p:txBody>
+          <a:bodyPr wrap="none" lIns="90000" rIns="90000" tIns="45000" bIns="45000"/>
+          <a:p>
+            <a:pPr algn="ctr">
+              <a:lnSpc>
+                <a:spcPct val="100000"/>
+              </a:lnSpc>
+            </a:pPr>
+            <a:r>
+              <a:rPr b="0" lang="en-GB" sz="3000" spc="-1" strike="noStrike">
+                <a:solidFill>
+                  <a:srgbClr val="000000"/>
+                </a:solidFill>
+                <a:latin typeface="Arial"/>
+                <a:ea typeface="DejaVu Sans"/>
+              </a:rPr>
+              <a:t>Tape ton choix (1, 2 ou 3)</a:t>
+            </a:r>
+            <a:endParaRPr b="0" lang="en-GB" sz="3000" spc="-1" strike="noStrike">
+              <a:latin typeface="Arial"/>
+            </a:endParaRPr>
+          </a:p>
+        </p:txBody>
+      </p:sp>
+    </p:spTree>
+  </p:cSld>
+</p:sld>
+</file>
+
+<file path=ppt/slides/slide18.xml><?xml version="1.0" encoding="utf-8"?>
+<p:sld xmlns:a="http://schemas.openxmlformats.org/drawingml/2006/main" xmlns:p="http://schemas.openxmlformats.org/presentationml/2006/main" xmlns:r="http://schemas.openxmlformats.org/officeDocument/2006/relationships" xmlns:p14="http://schemas.microsoft.com/office/powerpoint/2010/main" xmlns:p15="http://schemas.microsoft.com/office/powerpoint/2012/main" xmlns:mc="http://schemas.openxmlformats.org/markup-compatibility/2006">
+  <p:cSld>
+    <p:spTree>
+      <p:nvGrpSpPr>
+        <p:cNvPr id="1" name=""/>
+        <p:cNvGrpSpPr/>
+        <p:nvPr/>
+      </p:nvGrpSpPr>
+      <p:grpSpPr>
+        <a:xfrm>
+          <a:off x="0" y="0"/>
+          <a:ext cx="0" cy="0"/>
+          <a:chOff x="0" y="0"/>
+          <a:chExt cx="0" cy="0"/>
+        </a:xfrm>
+      </p:grpSpPr>
+      <p:sp>
+        <p:nvSpPr>
+          <p:cNvPr id="208" name="CustomShape 1"/>
+          <p:cNvSpPr/>
+          <p:nvPr/>
+        </p:nvSpPr>
+        <p:spPr>
+          <a:xfrm>
+            <a:off x="838080" y="365040"/>
+            <a:ext cx="10513800" cy="1323720"/>
+          </a:xfrm>
+          <a:prstGeom prst="rect">
+            <a:avLst/>
+          </a:prstGeom>
+          <a:noFill/>
+          <a:ln>
+            <a:noFill/>
+          </a:ln>
+        </p:spPr>
+        <p:style>
+          <a:lnRef idx="0"/>
+          <a:fillRef idx="0"/>
+          <a:effectRef idx="0"/>
+          <a:fontRef idx="minor"/>
+        </p:style>
+      </p:sp>
+      <p:sp>
+        <p:nvSpPr>
+          <p:cNvPr id="209" name="CustomShape 2"/>
+          <p:cNvSpPr/>
+          <p:nvPr/>
+        </p:nvSpPr>
+        <p:spPr>
+          <a:xfrm>
+            <a:off x="838080" y="1825560"/>
+            <a:ext cx="3384360" cy="2073600"/>
+          </a:xfrm>
+          <a:prstGeom prst="rect">
+            <a:avLst/>
+          </a:prstGeom>
+          <a:noFill/>
+          <a:ln>
+            <a:noFill/>
+          </a:ln>
+        </p:spPr>
+        <p:style>
+          <a:lnRef idx="0"/>
+          <a:fillRef idx="0"/>
+          <a:effectRef idx="0"/>
+          <a:fontRef idx="minor"/>
+        </p:style>
+      </p:sp>
+      <p:sp>
+        <p:nvSpPr>
+          <p:cNvPr id="210" name="CustomShape 3"/>
+          <p:cNvSpPr/>
+          <p:nvPr/>
+        </p:nvSpPr>
+        <p:spPr>
+          <a:xfrm>
+            <a:off x="4393440" y="1825560"/>
+            <a:ext cx="3384360" cy="2073600"/>
+          </a:xfrm>
+          <a:prstGeom prst="rect">
+            <a:avLst/>
+          </a:prstGeom>
+          <a:noFill/>
+          <a:ln>
+            <a:noFill/>
+          </a:ln>
+        </p:spPr>
+        <p:style>
+          <a:lnRef idx="0"/>
+          <a:fillRef idx="0"/>
+          <a:effectRef idx="0"/>
+          <a:fontRef idx="minor"/>
+        </p:style>
+      </p:sp>
+      <p:sp>
+        <p:nvSpPr>
+          <p:cNvPr id="211" name="CustomShape 4"/>
+          <p:cNvSpPr/>
+          <p:nvPr/>
+        </p:nvSpPr>
+        <p:spPr>
+          <a:xfrm>
+            <a:off x="7949160" y="1825560"/>
+            <a:ext cx="3384360" cy="2073600"/>
+          </a:xfrm>
+          <a:prstGeom prst="rect">
+            <a:avLst/>
+          </a:prstGeom>
+          <a:noFill/>
+          <a:ln>
+            <a:noFill/>
+          </a:ln>
+        </p:spPr>
+        <p:style>
+          <a:lnRef idx="0"/>
+          <a:fillRef idx="0"/>
+          <a:effectRef idx="0"/>
+          <a:fontRef idx="minor"/>
+        </p:style>
+      </p:sp>
+      <p:sp>
+        <p:nvSpPr>
+          <p:cNvPr id="212" name="CustomShape 5"/>
+          <p:cNvSpPr/>
+          <p:nvPr/>
+        </p:nvSpPr>
+        <p:spPr>
+          <a:xfrm>
+            <a:off x="838080" y="4098240"/>
+            <a:ext cx="3384360" cy="2073600"/>
+          </a:xfrm>
+          <a:prstGeom prst="rect">
+            <a:avLst/>
+          </a:prstGeom>
+          <a:noFill/>
+          <a:ln>
+            <a:noFill/>
+          </a:ln>
+        </p:spPr>
+        <p:style>
+          <a:lnRef idx="0"/>
+          <a:fillRef idx="0"/>
+          <a:effectRef idx="0"/>
+          <a:fontRef idx="minor"/>
+        </p:style>
+      </p:sp>
+      <p:sp>
+        <p:nvSpPr>
+          <p:cNvPr id="213" name="CustomShape 6"/>
+          <p:cNvSpPr/>
+          <p:nvPr/>
+        </p:nvSpPr>
+        <p:spPr>
+          <a:xfrm>
+            <a:off x="4393440" y="4098240"/>
+            <a:ext cx="3384360" cy="2073600"/>
+          </a:xfrm>
+          <a:prstGeom prst="rect">
+            <a:avLst/>
+          </a:prstGeom>
+          <a:noFill/>
+          <a:ln>
+            <a:noFill/>
+          </a:ln>
+        </p:spPr>
+        <p:style>
+          <a:lnRef idx="0"/>
+          <a:fillRef idx="0"/>
+          <a:effectRef idx="0"/>
+          <a:fontRef idx="minor"/>
+        </p:style>
+      </p:sp>
+      <p:sp>
+        <p:nvSpPr>
+          <p:cNvPr id="214" name="CustomShape 7"/>
+          <p:cNvSpPr/>
+          <p:nvPr/>
+        </p:nvSpPr>
+        <p:spPr>
+          <a:xfrm>
+            <a:off x="7949160" y="4098240"/>
+            <a:ext cx="3384360" cy="2073600"/>
+          </a:xfrm>
+          <a:prstGeom prst="rect">
+            <a:avLst/>
+          </a:prstGeom>
+          <a:noFill/>
+          <a:ln>
+            <a:noFill/>
+          </a:ln>
+        </p:spPr>
+        <p:style>
+          <a:lnRef idx="0"/>
+          <a:fillRef idx="0"/>
+          <a:effectRef idx="0"/>
+          <a:fontRef idx="minor"/>
+        </p:style>
       </p:sp>
       <p:pic>
         <p:nvPicPr>
-          <p:cNvPr id="206" name="" descr=""/>
+          <p:cNvPr id="215" name="" descr=""/>
           <p:cNvPicPr/>
           <p:nvPr/>
         </p:nvPicPr>
@@ -7473,7 +8109,7 @@
         <p:spPr>
           <a:xfrm>
             <a:off x="4176000" y="2376000"/>
-            <a:ext cx="3403800" cy="4164480"/>
+            <a:ext cx="3403440" cy="4164120"/>
           </a:xfrm>
           <a:prstGeom prst="rect">
             <a:avLst/>
@@ -7485,14 +8121,14 @@
       </p:pic>
       <p:sp>
         <p:nvSpPr>
-          <p:cNvPr id="207" name="CustomShape 8"/>
+          <p:cNvPr id="216" name="CustomShape 8"/>
           <p:cNvSpPr/>
           <p:nvPr/>
         </p:nvSpPr>
         <p:spPr>
           <a:xfrm>
             <a:off x="3535920" y="206640"/>
-            <a:ext cx="4669560" cy="698760"/>
+            <a:ext cx="4669200" cy="698400"/>
           </a:xfrm>
           <a:prstGeom prst="rect">
             <a:avLst/>
@@ -7567,10 +8203,10 @@
   <p:timing>
     <p:tnLst>
       <p:par>
-        <p:cTn id="17" dur="indefinite" restart="never" nodeType="tmRoot">
+        <p:cTn id="19" dur="indefinite" restart="never" nodeType="tmRoot">
           <p:childTnLst>
             <p:seq>
-              <p:cTn id="18" dur="indefinite" nodeType="mainSeq"/>
+              <p:cTn id="20" dur="indefinite" nodeType="mainSeq"/>
               <p:prevCondLst>
                 <p:cond delay="0" evt="onPrev">
                   <p:tgtEl>
@@ -7620,7 +8256,7 @@
         <p:spPr>
           <a:xfrm>
             <a:off x="3535560" y="206640"/>
-            <a:ext cx="4669560" cy="698760"/>
+            <a:ext cx="4669200" cy="698400"/>
           </a:xfrm>
           <a:prstGeom prst="rect">
             <a:avLst/>
@@ -7669,7 +8305,7 @@
         <p:spPr>
           <a:xfrm>
             <a:off x="3948120" y="1280880"/>
-            <a:ext cx="1153800" cy="546120"/>
+            <a:ext cx="1153440" cy="545760"/>
           </a:xfrm>
           <a:prstGeom prst="rect">
             <a:avLst/>
@@ -7695,7 +8331,7 @@
         <p:spPr>
           <a:xfrm>
             <a:off x="6606000" y="1280880"/>
-            <a:ext cx="1033560" cy="546120"/>
+            <a:ext cx="1033200" cy="545760"/>
           </a:xfrm>
           <a:prstGeom prst="rect">
             <a:avLst/>
@@ -7721,7 +8357,7 @@
         <p:spPr>
           <a:xfrm>
             <a:off x="5685840" y="1280880"/>
-            <a:ext cx="402480" cy="546120"/>
+            <a:ext cx="402120" cy="545760"/>
           </a:xfrm>
           <a:prstGeom prst="rect">
             <a:avLst/>
@@ -7770,7 +8406,7 @@
         <p:spPr>
           <a:xfrm>
             <a:off x="3446280" y="2112840"/>
-            <a:ext cx="5033880" cy="698760"/>
+            <a:ext cx="5033520" cy="698400"/>
           </a:xfrm>
           <a:prstGeom prst="rect">
             <a:avLst/>
@@ -7819,7 +8455,7 @@
         <p:spPr>
           <a:xfrm>
             <a:off x="833040" y="3191760"/>
-            <a:ext cx="7371720" cy="546120"/>
+            <a:ext cx="7371360" cy="545760"/>
           </a:xfrm>
           <a:prstGeom prst="rect">
             <a:avLst/>
@@ -7868,7 +8504,7 @@
         <p:spPr>
           <a:xfrm>
             <a:off x="837000" y="4023720"/>
-            <a:ext cx="7920360" cy="546120"/>
+            <a:ext cx="7920000" cy="545760"/>
           </a:xfrm>
           <a:prstGeom prst="rect">
             <a:avLst/>
@@ -7917,7 +8553,7 @@
         <p:spPr>
           <a:xfrm>
             <a:off x="838440" y="4855680"/>
-            <a:ext cx="8258760" cy="546120"/>
+            <a:ext cx="8258400" cy="545760"/>
           </a:xfrm>
           <a:prstGeom prst="rect">
             <a:avLst/>
@@ -7966,7 +8602,7 @@
         <p:spPr>
           <a:xfrm>
             <a:off x="3854880" y="5780880"/>
-            <a:ext cx="4473000" cy="546120"/>
+            <a:ext cx="4472640" cy="545760"/>
           </a:xfrm>
           <a:prstGeom prst="rect">
             <a:avLst/>
@@ -8037,7 +8673,7 @@
         <p:spPr>
           <a:xfrm>
             <a:off x="5347800" y="3254040"/>
-            <a:ext cx="440640" cy="622800"/>
+            <a:ext cx="440280" cy="622440"/>
           </a:xfrm>
           <a:prstGeom prst="rect">
             <a:avLst/>
@@ -8086,7 +8722,7 @@
         <p:spPr>
           <a:xfrm>
             <a:off x="3587400" y="1260000"/>
-            <a:ext cx="3884760" cy="622800"/>
+            <a:ext cx="3884400" cy="622440"/>
           </a:xfrm>
           <a:prstGeom prst="rect">
             <a:avLst/>
@@ -8184,7 +8820,7 @@
         <p:spPr>
           <a:xfrm>
             <a:off x="3362400" y="918360"/>
-            <a:ext cx="4811400" cy="546120"/>
+            <a:ext cx="4811040" cy="545760"/>
           </a:xfrm>
           <a:prstGeom prst="rect">
             <a:avLst/>
@@ -8233,7 +8869,7 @@
         <p:spPr>
           <a:xfrm>
             <a:off x="3621960" y="2238120"/>
-            <a:ext cx="4051080" cy="546120"/>
+            <a:ext cx="4050720" cy="545760"/>
           </a:xfrm>
           <a:prstGeom prst="rect">
             <a:avLst/>
@@ -8282,7 +8918,7 @@
         <p:spPr>
           <a:xfrm>
             <a:off x="3504240" y="3558240"/>
-            <a:ext cx="1153800" cy="546120"/>
+            <a:ext cx="1153440" cy="545760"/>
           </a:xfrm>
           <a:prstGeom prst="rect">
             <a:avLst/>
@@ -8331,7 +8967,7 @@
         <p:spPr>
           <a:xfrm>
             <a:off x="6482520" y="3558240"/>
-            <a:ext cx="391680" cy="546120"/>
+            <a:ext cx="391320" cy="545760"/>
           </a:xfrm>
           <a:prstGeom prst="rect">
             <a:avLst/>
@@ -8380,7 +9016,7 @@
         <p:spPr>
           <a:xfrm>
             <a:off x="5241600" y="3558240"/>
-            <a:ext cx="402480" cy="546120"/>
+            <a:ext cx="402120" cy="545760"/>
           </a:xfrm>
           <a:prstGeom prst="rect">
             <a:avLst/>
@@ -8478,7 +9114,7 @@
         <p:spPr>
           <a:xfrm>
             <a:off x="3362400" y="918000"/>
-            <a:ext cx="4811400" cy="546120"/>
+            <a:ext cx="4811040" cy="545760"/>
           </a:xfrm>
           <a:prstGeom prst="rect">
             <a:avLst/>
@@ -8527,7 +9163,7 @@
         <p:spPr>
           <a:xfrm>
             <a:off x="3621960" y="2237760"/>
-            <a:ext cx="4051080" cy="546120"/>
+            <a:ext cx="4050720" cy="545760"/>
           </a:xfrm>
           <a:prstGeom prst="rect">
             <a:avLst/>
@@ -8576,7 +9212,7 @@
         <p:spPr>
           <a:xfrm>
             <a:off x="6482520" y="3557880"/>
-            <a:ext cx="391680" cy="546120"/>
+            <a:ext cx="391320" cy="545760"/>
           </a:xfrm>
           <a:prstGeom prst="rect">
             <a:avLst/>
@@ -8625,7 +9261,7 @@
         <p:spPr>
           <a:xfrm>
             <a:off x="5241600" y="3557880"/>
-            <a:ext cx="402480" cy="546120"/>
+            <a:ext cx="402120" cy="545760"/>
           </a:xfrm>
           <a:prstGeom prst="rect">
             <a:avLst/>
@@ -8723,7 +9359,7 @@
         <p:spPr>
           <a:xfrm>
             <a:off x="3320280" y="1256760"/>
-            <a:ext cx="4669560" cy="698760"/>
+            <a:ext cx="4669200" cy="698400"/>
           </a:xfrm>
           <a:prstGeom prst="rect">
             <a:avLst/>
@@ -8772,7 +9408,7 @@
         <p:spPr>
           <a:xfrm>
             <a:off x="3605760" y="2959920"/>
-            <a:ext cx="1153800" cy="546120"/>
+            <a:ext cx="1153440" cy="545760"/>
           </a:xfrm>
           <a:prstGeom prst="rect">
             <a:avLst/>
@@ -8821,7 +9457,7 @@
         <p:spPr>
           <a:xfrm>
             <a:off x="6263280" y="2959920"/>
-            <a:ext cx="1033560" cy="546120"/>
+            <a:ext cx="1033200" cy="545760"/>
           </a:xfrm>
           <a:prstGeom prst="rect">
             <a:avLst/>
@@ -8870,7 +9506,7 @@
         <p:spPr>
           <a:xfrm>
             <a:off x="5343120" y="2959920"/>
-            <a:ext cx="402480" cy="546120"/>
+            <a:ext cx="402120" cy="545760"/>
           </a:xfrm>
           <a:prstGeom prst="rect">
             <a:avLst/>
@@ -8919,7 +9555,7 @@
         <p:spPr>
           <a:xfrm>
             <a:off x="2279880" y="4339080"/>
-            <a:ext cx="6528960" cy="546120"/>
+            <a:ext cx="6528600" cy="545760"/>
           </a:xfrm>
           <a:prstGeom prst="rect">
             <a:avLst/>
@@ -8989,8 +9625,8 @@
         </p:nvSpPr>
         <p:spPr>
           <a:xfrm>
-            <a:off x="1308240" y="997200"/>
-            <a:ext cx="8941320" cy="1917720"/>
+            <a:off x="3320280" y="1256760"/>
+            <a:ext cx="4669200" cy="698400"/>
           </a:xfrm>
           <a:prstGeom prst="rect">
             <a:avLst/>
@@ -9022,37 +9658,7 @@
                 <a:latin typeface="Arial"/>
                 <a:ea typeface="DejaVu Sans"/>
               </a:rPr>
-              <a:t>Ooups ! </a:t>
-            </a:r>
-            <a:endParaRPr b="0" lang="en-GB" sz="4000" spc="-1" strike="noStrike">
-              <a:latin typeface="Arial"/>
-            </a:endParaRPr>
-          </a:p>
-          <a:p>
-            <a:pPr algn="ctr">
-              <a:lnSpc>
-                <a:spcPct val="100000"/>
-              </a:lnSpc>
-            </a:pPr>
-            <a:endParaRPr b="0" lang="en-GB" sz="4000" spc="-1" strike="noStrike">
-              <a:latin typeface="Arial"/>
-            </a:endParaRPr>
-          </a:p>
-          <a:p>
-            <a:pPr algn="ctr">
-              <a:lnSpc>
-                <a:spcPct val="100000"/>
-              </a:lnSpc>
-            </a:pPr>
-            <a:r>
-              <a:rPr b="0" lang="en-GB" sz="4000" spc="-1" strike="noStrike">
-                <a:solidFill>
-                  <a:srgbClr val="000000"/>
-                </a:solidFill>
-                <a:latin typeface="Arial"/>
-                <a:ea typeface="DejaVu Sans"/>
-              </a:rPr>
-              <a:t>Tu n’as pas écrit le mot correctement...</a:t>
+              <a:t>Bravo ! Tu as réussi</a:t>
             </a:r>
             <a:endParaRPr b="0" lang="en-GB" sz="4000" spc="-1" strike="noStrike">
               <a:latin typeface="Arial"/>
@@ -9068,8 +9674,8 @@
         </p:nvSpPr>
         <p:spPr>
           <a:xfrm>
-            <a:off x="3535560" y="3851280"/>
-            <a:ext cx="1316880" cy="622800"/>
+            <a:off x="5343120" y="2959920"/>
+            <a:ext cx="402120" cy="545760"/>
           </a:xfrm>
           <a:prstGeom prst="rect">
             <a:avLst/>
@@ -9094,16 +9700,16 @@
               </a:lnSpc>
             </a:pPr>
             <a:r>
-              <a:rPr b="0" lang="en-GB" sz="3500" spc="-1" strike="noStrike">
+              <a:rPr b="0" lang="en-GB" sz="3000" spc="-1" strike="noStrike">
                 <a:solidFill>
                   <a:srgbClr val="000000"/>
                 </a:solidFill>
                 <a:latin typeface="Arial"/>
                 <a:ea typeface="DejaVu Sans"/>
               </a:rPr>
-              <a:t>Vonat</a:t>
-            </a:r>
-            <a:endParaRPr b="0" lang="en-GB" sz="3500" spc="-1" strike="noStrike">
+              <a:t>=</a:t>
+            </a:r>
+            <a:endParaRPr b="0" lang="en-GB" sz="3000" spc="-1" strike="noStrike">
               <a:latin typeface="Arial"/>
             </a:endParaRPr>
           </a:p>
@@ -9117,8 +9723,8 @@
         </p:nvSpPr>
         <p:spPr>
           <a:xfrm>
-            <a:off x="6203160" y="3851280"/>
-            <a:ext cx="1176840" cy="622800"/>
+            <a:off x="2279880" y="4339080"/>
+            <a:ext cx="6528600" cy="545760"/>
           </a:xfrm>
           <a:prstGeom prst="rect">
             <a:avLst/>
@@ -9143,212 +9749,16 @@
               </a:lnSpc>
             </a:pPr>
             <a:r>
-              <a:rPr b="0" lang="en-GB" sz="3500" spc="-1" strike="noStrike">
+              <a:rPr b="0" lang="en-GB" sz="3000" spc="-1" strike="noStrike">
                 <a:solidFill>
                   <a:srgbClr val="000000"/>
                 </a:solidFill>
                 <a:latin typeface="Arial"/>
                 <a:ea typeface="DejaVu Sans"/>
               </a:rPr>
-              <a:t>Train</a:t>
-            </a:r>
-            <a:endParaRPr b="0" lang="en-GB" sz="3500" spc="-1" strike="noStrike">
-              <a:latin typeface="Arial"/>
-            </a:endParaRPr>
-          </a:p>
-        </p:txBody>
-      </p:sp>
-      <p:sp>
-        <p:nvSpPr>
-          <p:cNvPr id="151" name="CustomShape 4"/>
-          <p:cNvSpPr/>
-          <p:nvPr/>
-        </p:nvSpPr>
-        <p:spPr>
-          <a:xfrm>
-            <a:off x="5335200" y="3851280"/>
-            <a:ext cx="440640" cy="622800"/>
-          </a:xfrm>
-          <a:prstGeom prst="rect">
-            <a:avLst/>
-          </a:prstGeom>
-          <a:noFill/>
-          <a:ln>
-            <a:noFill/>
-          </a:ln>
-        </p:spPr>
-        <p:style>
-          <a:lnRef idx="0"/>
-          <a:fillRef idx="0"/>
-          <a:effectRef idx="0"/>
-          <a:fontRef idx="minor"/>
-        </p:style>
-        <p:txBody>
-          <a:bodyPr wrap="none" lIns="90000" rIns="90000" tIns="45000" bIns="45000"/>
-          <a:p>
-            <a:pPr algn="ctr">
-              <a:lnSpc>
-                <a:spcPct val="100000"/>
-              </a:lnSpc>
-            </a:pPr>
-            <a:r>
-              <a:rPr b="0" lang="en-GB" sz="3500" spc="-1" strike="noStrike">
-                <a:solidFill>
-                  <a:srgbClr val="000000"/>
-                </a:solidFill>
-                <a:latin typeface="Arial"/>
-                <a:ea typeface="DejaVu Sans"/>
-              </a:rPr>
-              <a:t>=</a:t>
-            </a:r>
-            <a:endParaRPr b="0" lang="en-GB" sz="3500" spc="-1" strike="noStrike">
-              <a:latin typeface="Arial"/>
-            </a:endParaRPr>
-          </a:p>
-        </p:txBody>
-      </p:sp>
-      <p:sp>
-        <p:nvSpPr>
-          <p:cNvPr id="152" name="CustomShape 5"/>
-          <p:cNvSpPr/>
-          <p:nvPr/>
-        </p:nvSpPr>
-        <p:spPr>
-          <a:xfrm>
-            <a:off x="6288120" y="3429000"/>
-            <a:ext cx="1158480" cy="394200"/>
-          </a:xfrm>
-          <a:prstGeom prst="rect">
-            <a:avLst/>
-          </a:prstGeom>
-          <a:noFill/>
-          <a:ln>
-            <a:noFill/>
-          </a:ln>
-        </p:spPr>
-        <p:style>
-          <a:lnRef idx="0"/>
-          <a:fillRef idx="0"/>
-          <a:effectRef idx="0"/>
-          <a:fontRef idx="minor"/>
-        </p:style>
-        <p:txBody>
-          <a:bodyPr wrap="none" lIns="90000" rIns="90000" tIns="45000" bIns="45000"/>
-          <a:p>
-            <a:pPr>
-              <a:lnSpc>
-                <a:spcPct val="100000"/>
-              </a:lnSpc>
-            </a:pPr>
-            <a:r>
-              <a:rPr b="0" lang="en-GB" sz="2000" spc="-1" strike="noStrike">
-                <a:solidFill>
-                  <a:srgbClr val="000000"/>
-                </a:solidFill>
-                <a:latin typeface="Arial"/>
-                <a:ea typeface="DejaVu Sans"/>
-              </a:rPr>
-              <a:t>Français</a:t>
-            </a:r>
-            <a:endParaRPr b="0" lang="en-GB" sz="2000" spc="-1" strike="noStrike">
-              <a:latin typeface="Arial"/>
-            </a:endParaRPr>
-          </a:p>
-        </p:txBody>
-      </p:sp>
-      <p:sp>
-        <p:nvSpPr>
-          <p:cNvPr id="153" name="CustomShape 6"/>
-          <p:cNvSpPr/>
-          <p:nvPr/>
-        </p:nvSpPr>
-        <p:spPr>
-          <a:xfrm>
-            <a:off x="3531960" y="3450960"/>
-            <a:ext cx="1200960" cy="394200"/>
-          </a:xfrm>
-          <a:prstGeom prst="rect">
-            <a:avLst/>
-          </a:prstGeom>
-          <a:noFill/>
-          <a:ln>
-            <a:noFill/>
-          </a:ln>
-        </p:spPr>
-        <p:style>
-          <a:lnRef idx="0"/>
-          <a:fillRef idx="0"/>
-          <a:effectRef idx="0"/>
-          <a:fontRef idx="minor"/>
-        </p:style>
-        <p:txBody>
-          <a:bodyPr wrap="none" lIns="90000" rIns="90000" tIns="45000" bIns="45000"/>
-          <a:p>
-            <a:pPr>
-              <a:lnSpc>
-                <a:spcPct val="100000"/>
-              </a:lnSpc>
-            </a:pPr>
-            <a:r>
-              <a:rPr b="0" lang="en-GB" sz="2000" spc="-1" strike="noStrike">
-                <a:solidFill>
-                  <a:srgbClr val="000000"/>
-                </a:solidFill>
-                <a:latin typeface="Arial"/>
-                <a:ea typeface="DejaVu Sans"/>
-              </a:rPr>
-              <a:t>Hongrois</a:t>
-            </a:r>
-            <a:endParaRPr b="0" lang="en-GB" sz="2000" spc="-1" strike="noStrike">
-              <a:latin typeface="Arial"/>
-            </a:endParaRPr>
-          </a:p>
-        </p:txBody>
-      </p:sp>
-      <p:sp>
-        <p:nvSpPr>
-          <p:cNvPr id="154" name="CustomShape 7"/>
-          <p:cNvSpPr/>
-          <p:nvPr/>
-        </p:nvSpPr>
-        <p:spPr>
-          <a:xfrm>
-            <a:off x="1576440" y="5229720"/>
-            <a:ext cx="7958520" cy="622800"/>
-          </a:xfrm>
-          <a:prstGeom prst="rect">
-            <a:avLst/>
-          </a:prstGeom>
-          <a:noFill/>
-          <a:ln>
-            <a:noFill/>
-          </a:ln>
-        </p:spPr>
-        <p:style>
-          <a:lnRef idx="0"/>
-          <a:fillRef idx="0"/>
-          <a:effectRef idx="0"/>
-          <a:fontRef idx="minor"/>
-        </p:style>
-        <p:txBody>
-          <a:bodyPr wrap="none" lIns="90000" rIns="90000" tIns="45000" bIns="45000"/>
-          <a:p>
-            <a:pPr algn="ctr">
-              <a:lnSpc>
-                <a:spcPct val="100000"/>
-              </a:lnSpc>
-            </a:pPr>
-            <a:r>
-              <a:rPr b="0" lang="en-GB" sz="3500" spc="-1" strike="noStrike">
-                <a:solidFill>
-                  <a:srgbClr val="000000"/>
-                </a:solidFill>
-                <a:latin typeface="Arial"/>
-                <a:ea typeface="DejaVu Sans"/>
-              </a:rPr>
-              <a:t>Appuie sur une touche pour réessayer !</a:t>
-            </a:r>
-            <a:endParaRPr b="0" lang="en-GB" sz="3500" spc="-1" strike="noStrike">
+              <a:t>Appuie sur une touche pour continuer</a:t>
+            </a:r>
+            <a:endParaRPr b="0" lang="en-GB" sz="3000" spc="-1" strike="noStrike">
               <a:latin typeface="Arial"/>
             </a:endParaRPr>
           </a:p>
@@ -9356,33 +9766,6 @@
       </p:sp>
     </p:spTree>
   </p:cSld>
-  <p:timing>
-    <p:tnLst>
-      <p:par>
-        <p:cTn id="9" dur="indefinite" restart="never" nodeType="tmRoot">
-          <p:childTnLst>
-            <p:seq>
-              <p:cTn id="10" dur="indefinite" nodeType="mainSeq"/>
-              <p:prevCondLst>
-                <p:cond delay="0" evt="onPrev">
-                  <p:tgtEl>
-                    <p:sldTgt/>
-                  </p:tgtEl>
-                </p:cond>
-              </p:prevCondLst>
-              <p:nextCondLst>
-                <p:cond delay="0" evt="onNext">
-                  <p:tgtEl>
-                    <p:sldTgt/>
-                  </p:tgtEl>
-                </p:cond>
-              </p:nextCondLst>
-            </p:seq>
-          </p:childTnLst>
-        </p:cTn>
-      </p:par>
-    </p:tnLst>
-  </p:timing>
 </p:sld>
 </file>
 
@@ -9405,14 +9788,14 @@
       </p:grpSpPr>
       <p:sp>
         <p:nvSpPr>
-          <p:cNvPr id="155" name="CustomShape 1"/>
+          <p:cNvPr id="151" name="CustomShape 1"/>
           <p:cNvSpPr/>
           <p:nvPr/>
         </p:nvSpPr>
         <p:spPr>
           <a:xfrm>
-            <a:off x="3362400" y="917640"/>
-            <a:ext cx="4811400" cy="546120"/>
+            <a:off x="1308240" y="997200"/>
+            <a:ext cx="8940960" cy="1917360"/>
           </a:xfrm>
           <a:prstGeom prst="rect">
             <a:avLst/>
@@ -9437,31 +9820,61 @@
               </a:lnSpc>
             </a:pPr>
             <a:r>
-              <a:rPr b="0" lang="en-GB" sz="3000" spc="-1" strike="noStrike">
+              <a:rPr b="0" lang="en-GB" sz="4000" spc="-1" strike="noStrike">
                 <a:solidFill>
                   <a:srgbClr val="000000"/>
                 </a:solidFill>
                 <a:latin typeface="Arial"/>
                 <a:ea typeface="DejaVu Sans"/>
               </a:rPr>
-              <a:t>Essaye de traduire ce mot !</a:t>
-            </a:r>
-            <a:endParaRPr b="0" lang="en-GB" sz="3000" spc="-1" strike="noStrike">
-              <a:latin typeface="Arial"/>
-            </a:endParaRPr>
-          </a:p>
-        </p:txBody>
-      </p:sp>
-      <p:sp>
-        <p:nvSpPr>
-          <p:cNvPr id="156" name="CustomShape 2"/>
+              <a:t>Ooups ! </a:t>
+            </a:r>
+            <a:endParaRPr b="0" lang="en-GB" sz="4000" spc="-1" strike="noStrike">
+              <a:latin typeface="Arial"/>
+            </a:endParaRPr>
+          </a:p>
+          <a:p>
+            <a:pPr algn="ctr">
+              <a:lnSpc>
+                <a:spcPct val="100000"/>
+              </a:lnSpc>
+            </a:pPr>
+            <a:endParaRPr b="0" lang="en-GB" sz="4000" spc="-1" strike="noStrike">
+              <a:latin typeface="Arial"/>
+            </a:endParaRPr>
+          </a:p>
+          <a:p>
+            <a:pPr algn="ctr">
+              <a:lnSpc>
+                <a:spcPct val="100000"/>
+              </a:lnSpc>
+            </a:pPr>
+            <a:r>
+              <a:rPr b="0" lang="en-GB" sz="4000" spc="-1" strike="noStrike">
+                <a:solidFill>
+                  <a:srgbClr val="000000"/>
+                </a:solidFill>
+                <a:latin typeface="Arial"/>
+                <a:ea typeface="DejaVu Sans"/>
+              </a:rPr>
+              <a:t>Tu n’as pas écrit le mot correctement...</a:t>
+            </a:r>
+            <a:endParaRPr b="0" lang="en-GB" sz="4000" spc="-1" strike="noStrike">
+              <a:latin typeface="Arial"/>
+            </a:endParaRPr>
+          </a:p>
+        </p:txBody>
+      </p:sp>
+      <p:sp>
+        <p:nvSpPr>
+          <p:cNvPr id="152" name="CustomShape 2"/>
           <p:cNvSpPr/>
           <p:nvPr/>
         </p:nvSpPr>
         <p:spPr>
           <a:xfrm>
-            <a:off x="3621960" y="2237400"/>
-            <a:ext cx="4051080" cy="546120"/>
+            <a:off x="3535560" y="3851280"/>
+            <a:ext cx="1316520" cy="622440"/>
           </a:xfrm>
           <a:prstGeom prst="rect">
             <a:avLst/>
@@ -9486,51 +9899,31 @@
               </a:lnSpc>
             </a:pPr>
             <a:r>
-              <a:rPr b="0" lang="en-GB" sz="3000" spc="-1" strike="noStrike">
+              <a:rPr b="0" lang="en-GB" sz="3500" spc="-1" strike="noStrike">
                 <a:solidFill>
                   <a:srgbClr val="000000"/>
                 </a:solidFill>
                 <a:latin typeface="Arial"/>
                 <a:ea typeface="DejaVu Sans"/>
               </a:rPr>
-              <a:t>Ecrit le mot en français</a:t>
-            </a:r>
-            <a:endParaRPr b="0" lang="en-GB" sz="3000" spc="-1" strike="noStrike">
-              <a:latin typeface="Arial"/>
-            </a:endParaRPr>
-          </a:p>
-          <a:p>
-            <a:pPr algn="ctr">
-              <a:lnSpc>
-                <a:spcPct val="100000"/>
-              </a:lnSpc>
-            </a:pPr>
-            <a:r>
-              <a:rPr b="0" lang="en-GB" sz="3000" spc="-1" strike="noStrike">
-                <a:solidFill>
-                  <a:srgbClr val="000000"/>
-                </a:solidFill>
-                <a:latin typeface="Arial"/>
-                <a:ea typeface="DejaVu Sans"/>
-              </a:rPr>
-              <a:t> </a:t>
-            </a:r>
-            <a:endParaRPr b="0" lang="en-GB" sz="3000" spc="-1" strike="noStrike">
-              <a:latin typeface="Arial"/>
-            </a:endParaRPr>
-          </a:p>
-        </p:txBody>
-      </p:sp>
-      <p:sp>
-        <p:nvSpPr>
-          <p:cNvPr id="157" name="CustomShape 3"/>
+              <a:t>Vonat</a:t>
+            </a:r>
+            <a:endParaRPr b="0" lang="en-GB" sz="3500" spc="-1" strike="noStrike">
+              <a:latin typeface="Arial"/>
+            </a:endParaRPr>
+          </a:p>
+        </p:txBody>
+      </p:sp>
+      <p:sp>
+        <p:nvSpPr>
+          <p:cNvPr id="153" name="CustomShape 3"/>
           <p:cNvSpPr/>
           <p:nvPr/>
         </p:nvSpPr>
         <p:spPr>
           <a:xfrm>
-            <a:off x="6482520" y="3557520"/>
-            <a:ext cx="391680" cy="546120"/>
+            <a:off x="6203160" y="3851280"/>
+            <a:ext cx="1176480" cy="622440"/>
           </a:xfrm>
           <a:prstGeom prst="rect">
             <a:avLst/>
@@ -9555,31 +9948,31 @@
               </a:lnSpc>
             </a:pPr>
             <a:r>
-              <a:rPr b="0" lang="en-GB" sz="3000" spc="-1" strike="noStrike">
+              <a:rPr b="0" lang="en-GB" sz="3500" spc="-1" strike="noStrike">
                 <a:solidFill>
                   <a:srgbClr val="000000"/>
                 </a:solidFill>
                 <a:latin typeface="Arial"/>
                 <a:ea typeface="DejaVu Sans"/>
               </a:rPr>
-              <a:t>?</a:t>
-            </a:r>
-            <a:endParaRPr b="0" lang="en-GB" sz="3000" spc="-1" strike="noStrike">
-              <a:latin typeface="Arial"/>
-            </a:endParaRPr>
-          </a:p>
-        </p:txBody>
-      </p:sp>
-      <p:sp>
-        <p:nvSpPr>
-          <p:cNvPr id="158" name="CustomShape 4"/>
+              <a:t>Train</a:t>
+            </a:r>
+            <a:endParaRPr b="0" lang="en-GB" sz="3500" spc="-1" strike="noStrike">
+              <a:latin typeface="Arial"/>
+            </a:endParaRPr>
+          </a:p>
+        </p:txBody>
+      </p:sp>
+      <p:sp>
+        <p:nvSpPr>
+          <p:cNvPr id="154" name="CustomShape 4"/>
           <p:cNvSpPr/>
           <p:nvPr/>
         </p:nvSpPr>
         <p:spPr>
           <a:xfrm>
-            <a:off x="5241600" y="3557520"/>
-            <a:ext cx="402480" cy="546120"/>
+            <a:off x="5335200" y="3851280"/>
+            <a:ext cx="440280" cy="622440"/>
           </a:xfrm>
           <a:prstGeom prst="rect">
             <a:avLst/>
@@ -9604,7 +9997,7 @@
               </a:lnSpc>
             </a:pPr>
             <a:r>
-              <a:rPr b="0" lang="en-GB" sz="3000" spc="-1" strike="noStrike">
+              <a:rPr b="0" lang="en-GB" sz="3500" spc="-1" strike="noStrike">
                 <a:solidFill>
                   <a:srgbClr val="000000"/>
                 </a:solidFill>
@@ -9613,7 +10006,154 @@
               </a:rPr>
               <a:t>=</a:t>
             </a:r>
-            <a:endParaRPr b="0" lang="en-GB" sz="3000" spc="-1" strike="noStrike">
+            <a:endParaRPr b="0" lang="en-GB" sz="3500" spc="-1" strike="noStrike">
+              <a:latin typeface="Arial"/>
+            </a:endParaRPr>
+          </a:p>
+        </p:txBody>
+      </p:sp>
+      <p:sp>
+        <p:nvSpPr>
+          <p:cNvPr id="155" name="CustomShape 5"/>
+          <p:cNvSpPr/>
+          <p:nvPr/>
+        </p:nvSpPr>
+        <p:spPr>
+          <a:xfrm>
+            <a:off x="6288120" y="3429000"/>
+            <a:ext cx="1158120" cy="393840"/>
+          </a:xfrm>
+          <a:prstGeom prst="rect">
+            <a:avLst/>
+          </a:prstGeom>
+          <a:noFill/>
+          <a:ln>
+            <a:noFill/>
+          </a:ln>
+        </p:spPr>
+        <p:style>
+          <a:lnRef idx="0"/>
+          <a:fillRef idx="0"/>
+          <a:effectRef idx="0"/>
+          <a:fontRef idx="minor"/>
+        </p:style>
+        <p:txBody>
+          <a:bodyPr wrap="none" lIns="90000" rIns="90000" tIns="45000" bIns="45000"/>
+          <a:p>
+            <a:pPr>
+              <a:lnSpc>
+                <a:spcPct val="100000"/>
+              </a:lnSpc>
+            </a:pPr>
+            <a:r>
+              <a:rPr b="0" lang="en-GB" sz="2000" spc="-1" strike="noStrike">
+                <a:solidFill>
+                  <a:srgbClr val="000000"/>
+                </a:solidFill>
+                <a:latin typeface="Arial"/>
+                <a:ea typeface="DejaVu Sans"/>
+              </a:rPr>
+              <a:t>Français</a:t>
+            </a:r>
+            <a:endParaRPr b="0" lang="en-GB" sz="2000" spc="-1" strike="noStrike">
+              <a:latin typeface="Arial"/>
+            </a:endParaRPr>
+          </a:p>
+        </p:txBody>
+      </p:sp>
+      <p:sp>
+        <p:nvSpPr>
+          <p:cNvPr id="156" name="CustomShape 6"/>
+          <p:cNvSpPr/>
+          <p:nvPr/>
+        </p:nvSpPr>
+        <p:spPr>
+          <a:xfrm>
+            <a:off x="3531960" y="3450960"/>
+            <a:ext cx="1200600" cy="393840"/>
+          </a:xfrm>
+          <a:prstGeom prst="rect">
+            <a:avLst/>
+          </a:prstGeom>
+          <a:noFill/>
+          <a:ln>
+            <a:noFill/>
+          </a:ln>
+        </p:spPr>
+        <p:style>
+          <a:lnRef idx="0"/>
+          <a:fillRef idx="0"/>
+          <a:effectRef idx="0"/>
+          <a:fontRef idx="minor"/>
+        </p:style>
+        <p:txBody>
+          <a:bodyPr wrap="none" lIns="90000" rIns="90000" tIns="45000" bIns="45000"/>
+          <a:p>
+            <a:pPr>
+              <a:lnSpc>
+                <a:spcPct val="100000"/>
+              </a:lnSpc>
+            </a:pPr>
+            <a:r>
+              <a:rPr b="0" lang="en-GB" sz="2000" spc="-1" strike="noStrike">
+                <a:solidFill>
+                  <a:srgbClr val="000000"/>
+                </a:solidFill>
+                <a:latin typeface="Arial"/>
+                <a:ea typeface="DejaVu Sans"/>
+              </a:rPr>
+              <a:t>Hongrois</a:t>
+            </a:r>
+            <a:endParaRPr b="0" lang="en-GB" sz="2000" spc="-1" strike="noStrike">
+              <a:latin typeface="Arial"/>
+            </a:endParaRPr>
+          </a:p>
+        </p:txBody>
+      </p:sp>
+      <p:sp>
+        <p:nvSpPr>
+          <p:cNvPr id="157" name="CustomShape 7"/>
+          <p:cNvSpPr/>
+          <p:nvPr/>
+        </p:nvSpPr>
+        <p:spPr>
+          <a:xfrm>
+            <a:off x="1576440" y="5229720"/>
+            <a:ext cx="7958160" cy="622440"/>
+          </a:xfrm>
+          <a:prstGeom prst="rect">
+            <a:avLst/>
+          </a:prstGeom>
+          <a:noFill/>
+          <a:ln>
+            <a:noFill/>
+          </a:ln>
+        </p:spPr>
+        <p:style>
+          <a:lnRef idx="0"/>
+          <a:fillRef idx="0"/>
+          <a:effectRef idx="0"/>
+          <a:fontRef idx="minor"/>
+        </p:style>
+        <p:txBody>
+          <a:bodyPr wrap="none" lIns="90000" rIns="90000" tIns="45000" bIns="45000"/>
+          <a:p>
+            <a:pPr algn="ctr">
+              <a:lnSpc>
+                <a:spcPct val="100000"/>
+              </a:lnSpc>
+            </a:pPr>
+            <a:r>
+              <a:rPr b="0" lang="en-GB" sz="3500" spc="-1" strike="noStrike">
+                <a:solidFill>
+                  <a:srgbClr val="000000"/>
+                </a:solidFill>
+                <a:latin typeface="Arial"/>
+                <a:ea typeface="DejaVu Sans"/>
+              </a:rPr>
+              <a:t>Appuie sur une touche pour réessayer !</a:t>
+            </a:r>
+            <a:endParaRPr b="0" lang="en-GB" sz="3500" spc="-1" strike="noStrike">
               <a:latin typeface="Arial"/>
             </a:endParaRPr>
           </a:p>
@@ -9624,10 +10164,10 @@
   <p:timing>
     <p:tnLst>
       <p:par>
-        <p:cTn id="11" dur="indefinite" restart="never" nodeType="tmRoot">
+        <p:cTn id="9" dur="indefinite" restart="never" nodeType="tmRoot">
           <p:childTnLst>
             <p:seq>
-              <p:cTn id="12" dur="indefinite" nodeType="mainSeq"/>
+              <p:cTn id="10" dur="indefinite" nodeType="mainSeq"/>
               <p:prevCondLst>
                 <p:cond delay="0" evt="onPrev">
                   <p:tgtEl>
@@ -9670,14 +10210,14 @@
       </p:grpSpPr>
       <p:sp>
         <p:nvSpPr>
-          <p:cNvPr id="159" name="CustomShape 1"/>
+          <p:cNvPr id="158" name="CustomShape 1"/>
           <p:cNvSpPr/>
           <p:nvPr/>
         </p:nvSpPr>
         <p:spPr>
           <a:xfrm>
-            <a:off x="1308240" y="997200"/>
-            <a:ext cx="8941320" cy="1917720"/>
+            <a:off x="1265400" y="400320"/>
+            <a:ext cx="8940960" cy="1917360"/>
           </a:xfrm>
           <a:prstGeom prst="rect">
             <a:avLst/>
@@ -9749,14 +10289,14 @@
       </p:sp>
       <p:sp>
         <p:nvSpPr>
-          <p:cNvPr id="160" name="CustomShape 2"/>
+          <p:cNvPr id="159" name="CustomShape 2"/>
           <p:cNvSpPr/>
           <p:nvPr/>
         </p:nvSpPr>
         <p:spPr>
           <a:xfrm>
-            <a:off x="5335200" y="3851280"/>
-            <a:ext cx="440640" cy="622800"/>
+            <a:off x="5292360" y="3254400"/>
+            <a:ext cx="440280" cy="622440"/>
           </a:xfrm>
           <a:prstGeom prst="rect">
             <a:avLst/>
@@ -9798,14 +10338,14 @@
       </p:sp>
       <p:sp>
         <p:nvSpPr>
-          <p:cNvPr id="161" name="CustomShape 3"/>
+          <p:cNvPr id="160" name="CustomShape 3"/>
           <p:cNvSpPr/>
           <p:nvPr/>
         </p:nvSpPr>
         <p:spPr>
           <a:xfrm>
-            <a:off x="6288120" y="3429000"/>
-            <a:ext cx="1158480" cy="394200"/>
+            <a:off x="6245280" y="2860560"/>
+            <a:ext cx="1158120" cy="393840"/>
           </a:xfrm>
           <a:prstGeom prst="rect">
             <a:avLst/>
@@ -9847,14 +10387,14 @@
       </p:sp>
       <p:sp>
         <p:nvSpPr>
-          <p:cNvPr id="162" name="CustomShape 4"/>
+          <p:cNvPr id="161" name="CustomShape 4"/>
           <p:cNvSpPr/>
           <p:nvPr/>
         </p:nvSpPr>
         <p:spPr>
           <a:xfrm>
-            <a:off x="3531960" y="3450960"/>
-            <a:ext cx="1200960" cy="394200"/>
+            <a:off x="3489120" y="2854080"/>
+            <a:ext cx="1200600" cy="393840"/>
           </a:xfrm>
           <a:prstGeom prst="rect">
             <a:avLst/>
@@ -9896,14 +10436,14 @@
       </p:sp>
       <p:sp>
         <p:nvSpPr>
-          <p:cNvPr id="163" name="CustomShape 5"/>
+          <p:cNvPr id="162" name="CustomShape 5"/>
           <p:cNvSpPr/>
           <p:nvPr/>
         </p:nvSpPr>
         <p:spPr>
           <a:xfrm>
-            <a:off x="1576440" y="5229720"/>
-            <a:ext cx="7958520" cy="622800"/>
+            <a:off x="1473840" y="5353560"/>
+            <a:ext cx="7958160" cy="622440"/>
           </a:xfrm>
           <a:prstGeom prst="rect">
             <a:avLst/>
@@ -9943,8 +10483,84 @@
           </a:p>
         </p:txBody>
       </p:sp>
+      <p:sp>
+        <p:nvSpPr>
+          <p:cNvPr id="163" name="CustomShape 6"/>
+          <p:cNvSpPr/>
+          <p:nvPr/>
+        </p:nvSpPr>
+        <p:spPr>
+          <a:xfrm>
+            <a:off x="1545840" y="4273560"/>
+            <a:ext cx="7958160" cy="622440"/>
+          </a:xfrm>
+          <a:prstGeom prst="rect">
+            <a:avLst/>
+          </a:prstGeom>
+          <a:noFill/>
+          <a:ln>
+            <a:noFill/>
+          </a:ln>
+        </p:spPr>
+        <p:style>
+          <a:lnRef idx="0"/>
+          <a:fillRef idx="0"/>
+          <a:effectRef idx="0"/>
+          <a:fontRef idx="minor"/>
+        </p:style>
+        <p:txBody>
+          <a:bodyPr wrap="none" lIns="90000" rIns="90000" tIns="45000" bIns="45000"/>
+          <a:p>
+            <a:pPr>
+              <a:lnSpc>
+                <a:spcPct val="100000"/>
+              </a:lnSpc>
+            </a:pPr>
+            <a:r>
+              <a:rPr b="0" lang="en-GB" sz="3500" spc="-1" strike="noStrike">
+                <a:solidFill>
+                  <a:srgbClr val="000000"/>
+                </a:solidFill>
+                <a:latin typeface="Arial"/>
+                <a:ea typeface="DejaVu Sans"/>
+              </a:rPr>
+              <a:t>Tu as écrit :</a:t>
+            </a:r>
+            <a:endParaRPr b="0" lang="en-GB" sz="3500" spc="-1" strike="noStrike">
+              <a:latin typeface="Arial"/>
+            </a:endParaRPr>
+          </a:p>
+        </p:txBody>
+      </p:sp>
     </p:spTree>
   </p:cSld>
+  <p:timing>
+    <p:tnLst>
+      <p:par>
+        <p:cTn id="11" dur="indefinite" restart="never" nodeType="tmRoot">
+          <p:childTnLst>
+            <p:seq>
+              <p:cTn id="12" dur="indefinite" nodeType="mainSeq"/>
+              <p:prevCondLst>
+                <p:cond delay="0" evt="onPrev">
+                  <p:tgtEl>
+                    <p:sldTgt/>
+                  </p:tgtEl>
+                </p:cond>
+              </p:prevCondLst>
+              <p:nextCondLst>
+                <p:cond delay="0" evt="onNext">
+                  <p:tgtEl>
+                    <p:sldTgt/>
+                  </p:tgtEl>
+                </p:cond>
+              </p:nextCondLst>
+            </p:seq>
+          </p:childTnLst>
+        </p:cTn>
+      </p:par>
+    </p:tnLst>
+  </p:timing>
 </p:sld>
 </file>
 

</xml_diff>